<commit_message>
added the word distribution calcultation
</commit_message>
<xml_diff>
--- a/Presentation/Final_ADA.pptx
+++ b/Presentation/Final_ADA.pptx
@@ -3693,7 +3693,16 @@
                 </a:solidFill>
                 <a:latin typeface="Century Gothic"/>
               </a:rPr>
-              <a:t> + Noun</a:t>
+              <a:t> + </a:t>
+            </a:r>
+            <a:r>
+              <a:rPr lang="fr-CH" sz="4000" dirty="0" smtClean="0">
+                <a:solidFill>
+                  <a:srgbClr val="333333"/>
+                </a:solidFill>
+                <a:latin typeface="Century Gothic"/>
+              </a:rPr>
+              <a:t>Noun</a:t>
             </a:r>
           </a:p>
           <a:p>
@@ -3704,7 +3713,151 @@
               <a:buFont typeface="+mj-lt"/>
               <a:buAutoNum type="arabicPeriod"/>
             </a:pPr>
-            <a:endParaRPr lang="fr-CH" sz="4000" dirty="0">
+            <a:r>
+              <a:rPr lang="fr-CH" sz="4000" dirty="0" err="1" smtClean="0">
+                <a:solidFill>
+                  <a:srgbClr val="333333"/>
+                </a:solidFill>
+                <a:latin typeface="Century Gothic"/>
+              </a:rPr>
+              <a:t>Cutoff</a:t>
+            </a:r>
+            <a:r>
+              <a:rPr lang="fr-CH" sz="4000" dirty="0" smtClean="0">
+                <a:solidFill>
+                  <a:srgbClr val="333333"/>
+                </a:solidFill>
+                <a:latin typeface="Century Gothic"/>
+              </a:rPr>
+              <a:t> </a:t>
+            </a:r>
+            <a:r>
+              <a:rPr lang="fr-CH" sz="4000" dirty="0" err="1" smtClean="0">
+                <a:solidFill>
+                  <a:srgbClr val="333333"/>
+                </a:solidFill>
+                <a:latin typeface="Century Gothic"/>
+              </a:rPr>
+              <a:t>Frequency</a:t>
+            </a:r>
+            <a:r>
+              <a:rPr lang="fr-CH" sz="4000" dirty="0" smtClean="0">
+                <a:solidFill>
+                  <a:srgbClr val="333333"/>
+                </a:solidFill>
+                <a:latin typeface="Century Gothic"/>
+              </a:rPr>
+              <a:t>: </a:t>
+            </a:r>
+            <a:r>
+              <a:rPr lang="fr-CH" sz="4000" dirty="0" err="1" smtClean="0">
+                <a:solidFill>
+                  <a:srgbClr val="333333"/>
+                </a:solidFill>
+                <a:latin typeface="Century Gothic"/>
+              </a:rPr>
+              <a:t>Removal</a:t>
+            </a:r>
+            <a:r>
+              <a:rPr lang="fr-CH" sz="4000" dirty="0" smtClean="0">
+                <a:solidFill>
+                  <a:srgbClr val="333333"/>
+                </a:solidFill>
+                <a:latin typeface="Century Gothic"/>
+              </a:rPr>
+              <a:t> </a:t>
+            </a:r>
+            <a:r>
+              <a:rPr lang="fr-CH" sz="4000" dirty="0" smtClean="0">
+                <a:solidFill>
+                  <a:srgbClr val="333333"/>
+                </a:solidFill>
+                <a:latin typeface="Century Gothic"/>
+              </a:rPr>
+              <a:t>of </a:t>
+            </a:r>
+            <a:r>
+              <a:rPr lang="fr-CH" sz="4000" dirty="0" err="1" smtClean="0">
+                <a:solidFill>
+                  <a:srgbClr val="333333"/>
+                </a:solidFill>
+                <a:latin typeface="Century Gothic"/>
+              </a:rPr>
+              <a:t>words</a:t>
+            </a:r>
+            <a:r>
+              <a:rPr lang="fr-CH" sz="4000" dirty="0" smtClean="0">
+                <a:solidFill>
+                  <a:srgbClr val="333333"/>
+                </a:solidFill>
+                <a:latin typeface="Century Gothic"/>
+              </a:rPr>
+              <a:t> </a:t>
+            </a:r>
+            <a:r>
+              <a:rPr lang="fr-CH" sz="4000" dirty="0" err="1" smtClean="0">
+                <a:solidFill>
+                  <a:srgbClr val="333333"/>
+                </a:solidFill>
+                <a:latin typeface="Century Gothic"/>
+              </a:rPr>
+              <a:t>that</a:t>
+            </a:r>
+            <a:r>
+              <a:rPr lang="fr-CH" sz="4000" dirty="0" smtClean="0">
+                <a:solidFill>
+                  <a:srgbClr val="333333"/>
+                </a:solidFill>
+                <a:latin typeface="Century Gothic"/>
+              </a:rPr>
+              <a:t> </a:t>
+            </a:r>
+            <a:r>
+              <a:rPr lang="fr-CH" sz="4000" dirty="0" err="1" smtClean="0">
+                <a:solidFill>
+                  <a:srgbClr val="333333"/>
+                </a:solidFill>
+                <a:latin typeface="Century Gothic"/>
+              </a:rPr>
+              <a:t>were</a:t>
+            </a:r>
+            <a:r>
+              <a:rPr lang="fr-CH" sz="4000" dirty="0" smtClean="0">
+                <a:solidFill>
+                  <a:srgbClr val="333333"/>
+                </a:solidFill>
+                <a:latin typeface="Century Gothic"/>
+              </a:rPr>
+              <a:t> not </a:t>
+            </a:r>
+            <a:r>
+              <a:rPr lang="fr-CH" sz="4000" dirty="0" err="1" smtClean="0">
+                <a:solidFill>
+                  <a:srgbClr val="333333"/>
+                </a:solidFill>
+                <a:latin typeface="Century Gothic"/>
+              </a:rPr>
+              <a:t>present</a:t>
+            </a:r>
+            <a:r>
+              <a:rPr lang="fr-CH" sz="4000" dirty="0" smtClean="0">
+                <a:solidFill>
+                  <a:srgbClr val="333333"/>
+                </a:solidFill>
+                <a:latin typeface="Century Gothic"/>
+              </a:rPr>
+              <a:t> </a:t>
+            </a:r>
+            <a:r>
+              <a:rPr lang="fr-CH" sz="4000" dirty="0" err="1" smtClean="0">
+                <a:solidFill>
+                  <a:srgbClr val="333333"/>
+                </a:solidFill>
+                <a:latin typeface="Century Gothic"/>
+              </a:rPr>
+              <a:t>enough</a:t>
+            </a:r>
+            <a:endParaRPr lang="fr-CH" sz="4000" dirty="0" smtClean="0">
               <a:solidFill>
                 <a:srgbClr val="333333"/>
               </a:solidFill>
@@ -3718,118 +3871,6 @@
               </a:buClr>
               <a:buFont typeface="+mj-lt"/>
               <a:buAutoNum type="arabicPeriod"/>
-            </a:pPr>
-            <a:r>
-              <a:rPr lang="fr-CH" sz="4000" dirty="0" err="1" smtClean="0">
-                <a:solidFill>
-                  <a:srgbClr val="333333"/>
-                </a:solidFill>
-                <a:latin typeface="Century Gothic"/>
-              </a:rPr>
-              <a:t>Removal</a:t>
-            </a:r>
-            <a:r>
-              <a:rPr lang="fr-CH" sz="4000" dirty="0" smtClean="0">
-                <a:solidFill>
-                  <a:srgbClr val="333333"/>
-                </a:solidFill>
-                <a:latin typeface="Century Gothic"/>
-              </a:rPr>
-              <a:t> of </a:t>
-            </a:r>
-            <a:r>
-              <a:rPr lang="fr-CH" sz="4000" dirty="0" err="1" smtClean="0">
-                <a:solidFill>
-                  <a:srgbClr val="333333"/>
-                </a:solidFill>
-                <a:latin typeface="Century Gothic"/>
-              </a:rPr>
-              <a:t>words</a:t>
-            </a:r>
-            <a:r>
-              <a:rPr lang="fr-CH" sz="4000" dirty="0" smtClean="0">
-                <a:solidFill>
-                  <a:srgbClr val="333333"/>
-                </a:solidFill>
-                <a:latin typeface="Century Gothic"/>
-              </a:rPr>
-              <a:t> </a:t>
-            </a:r>
-            <a:r>
-              <a:rPr lang="fr-CH" sz="4000" dirty="0" err="1" smtClean="0">
-                <a:solidFill>
-                  <a:srgbClr val="333333"/>
-                </a:solidFill>
-                <a:latin typeface="Century Gothic"/>
-              </a:rPr>
-              <a:t>that</a:t>
-            </a:r>
-            <a:r>
-              <a:rPr lang="fr-CH" sz="4000" dirty="0" smtClean="0">
-                <a:solidFill>
-                  <a:srgbClr val="333333"/>
-                </a:solidFill>
-                <a:latin typeface="Century Gothic"/>
-              </a:rPr>
-              <a:t> </a:t>
-            </a:r>
-            <a:r>
-              <a:rPr lang="fr-CH" sz="4000" dirty="0" err="1" smtClean="0">
-                <a:solidFill>
-                  <a:srgbClr val="333333"/>
-                </a:solidFill>
-                <a:latin typeface="Century Gothic"/>
-              </a:rPr>
-              <a:t>were</a:t>
-            </a:r>
-            <a:r>
-              <a:rPr lang="fr-CH" sz="4000" dirty="0" smtClean="0">
-                <a:solidFill>
-                  <a:srgbClr val="333333"/>
-                </a:solidFill>
-                <a:latin typeface="Century Gothic"/>
-              </a:rPr>
-              <a:t> not </a:t>
-            </a:r>
-            <a:r>
-              <a:rPr lang="fr-CH" sz="4000" dirty="0" err="1" smtClean="0">
-                <a:solidFill>
-                  <a:srgbClr val="333333"/>
-                </a:solidFill>
-                <a:latin typeface="Century Gothic"/>
-              </a:rPr>
-              <a:t>present</a:t>
-            </a:r>
-            <a:r>
-              <a:rPr lang="fr-CH" sz="4000" dirty="0" smtClean="0">
-                <a:solidFill>
-                  <a:srgbClr val="333333"/>
-                </a:solidFill>
-                <a:latin typeface="Century Gothic"/>
-              </a:rPr>
-              <a:t> </a:t>
-            </a:r>
-            <a:r>
-              <a:rPr lang="fr-CH" sz="4000" dirty="0" err="1" smtClean="0">
-                <a:solidFill>
-                  <a:srgbClr val="333333"/>
-                </a:solidFill>
-                <a:latin typeface="Century Gothic"/>
-              </a:rPr>
-              <a:t>enough</a:t>
-            </a:r>
-            <a:endParaRPr lang="fr-CH" sz="4000" dirty="0" smtClean="0">
-              <a:solidFill>
-                <a:srgbClr val="333333"/>
-              </a:solidFill>
-              <a:latin typeface="Century Gothic"/>
-            </a:endParaRPr>
-          </a:p>
-          <a:p>
-            <a:pPr>
-              <a:buClr>
-                <a:srgbClr val="990000"/>
-              </a:buClr>
             </a:pPr>
             <a:endParaRPr lang="fr-CH" sz="4000" b="1" dirty="0">
               <a:solidFill>
@@ -4485,16 +4526,278 @@
           </a:fontRef>
         </p:style>
       </p:cxnSp>
+      <p:sp>
+        <p:nvSpPr>
+          <p:cNvPr id="15" name="TextBox 14"/>
+          <p:cNvSpPr txBox="1"/>
+          <p:nvPr/>
+        </p:nvSpPr>
+        <p:spPr>
+          <a:xfrm>
+            <a:off x="380315" y="10563164"/>
+            <a:ext cx="10770738" cy="1569660"/>
+          </a:xfrm>
+          <a:prstGeom prst="rect">
+            <a:avLst/>
+          </a:prstGeom>
+          <a:noFill/>
+        </p:spPr>
+        <p:txBody>
+          <a:bodyPr wrap="square" rtlCol="0">
+            <a:spAutoFit/>
+          </a:bodyPr>
+          <a:lstStyle/>
+          <a:p>
+            <a:pPr>
+              <a:buClr>
+                <a:srgbClr val="990000"/>
+              </a:buClr>
+            </a:pPr>
+            <a:r>
+              <a:rPr lang="fr-CH" sz="4800" b="1" dirty="0" smtClean="0">
+                <a:solidFill>
+                  <a:srgbClr val="333333"/>
+                </a:solidFill>
+                <a:latin typeface="Century Gothic"/>
+              </a:rPr>
+              <a:t>Data </a:t>
+            </a:r>
+            <a:r>
+              <a:rPr lang="fr-CH" sz="4800" b="1" dirty="0" err="1" smtClean="0">
+                <a:solidFill>
+                  <a:srgbClr val="333333"/>
+                </a:solidFill>
+                <a:latin typeface="Century Gothic"/>
+              </a:rPr>
+              <a:t>Visualization</a:t>
+            </a:r>
+            <a:r>
+              <a:rPr lang="fr-CH" sz="4800" b="1" dirty="0" smtClean="0">
+                <a:solidFill>
+                  <a:srgbClr val="333333"/>
+                </a:solidFill>
+                <a:latin typeface="Century Gothic"/>
+              </a:rPr>
+              <a:t> and </a:t>
+            </a:r>
+            <a:r>
+              <a:rPr lang="fr-CH" sz="4800" b="1" dirty="0" err="1" smtClean="0">
+                <a:solidFill>
+                  <a:srgbClr val="333333"/>
+                </a:solidFill>
+                <a:latin typeface="Century Gothic"/>
+              </a:rPr>
+              <a:t>Processing</a:t>
+            </a:r>
+            <a:r>
+              <a:rPr lang="fr-CH" sz="4800" b="1" dirty="0" smtClean="0">
+                <a:solidFill>
+                  <a:srgbClr val="333333"/>
+                </a:solidFill>
+                <a:latin typeface="Century Gothic"/>
+              </a:rPr>
+              <a:t>:</a:t>
+            </a:r>
+            <a:endParaRPr lang="fr-CH" sz="4000" dirty="0" smtClean="0">
+              <a:solidFill>
+                <a:srgbClr val="333333"/>
+              </a:solidFill>
+              <a:latin typeface="Century Gothic"/>
+            </a:endParaRPr>
+          </a:p>
+          <a:p>
+            <a:pPr marL="914400" indent="-914400">
+              <a:buClr>
+                <a:srgbClr val="990000"/>
+              </a:buClr>
+              <a:buFont typeface="+mj-lt"/>
+              <a:buAutoNum type="arabicPeriod"/>
+            </a:pPr>
+            <a:endParaRPr lang="fr-CH" sz="4800" b="1" dirty="0">
+              <a:solidFill>
+                <a:srgbClr val="333333"/>
+              </a:solidFill>
+              <a:latin typeface="Century Gothic"/>
+            </a:endParaRPr>
+          </a:p>
+        </p:txBody>
+      </p:sp>
+      <p:grpSp>
+        <p:nvGrpSpPr>
+          <p:cNvPr id="11" name="Group 10"/>
+          <p:cNvGrpSpPr/>
+          <p:nvPr/>
+        </p:nvGrpSpPr>
+        <p:grpSpPr>
+          <a:xfrm>
+            <a:off x="380315" y="11692629"/>
+            <a:ext cx="10007600" cy="6304039"/>
+            <a:chOff x="3294417" y="15197830"/>
+            <a:chExt cx="10007600" cy="6304039"/>
+          </a:xfrm>
+        </p:grpSpPr>
+        <p:pic>
+          <p:nvPicPr>
+            <p:cNvPr id="7" name="Picture 6"/>
+            <p:cNvPicPr>
+              <a:picLocks noChangeAspect="1"/>
+            </p:cNvPicPr>
+            <p:nvPr/>
+          </p:nvPicPr>
+          <p:blipFill>
+            <a:blip r:embed="rId5">
+              <a:extLst>
+                <a:ext uri="{28A0092B-C50C-407E-A947-70E740481C1C}">
+                  <a14:useLocalDpi xmlns:a14="http://schemas.microsoft.com/office/drawing/2010/main" val="0"/>
+                </a:ext>
+              </a:extLst>
+            </a:blip>
+            <a:stretch>
+              <a:fillRect/>
+            </a:stretch>
+          </p:blipFill>
+          <p:spPr>
+            <a:xfrm>
+              <a:off x="3758515" y="15905717"/>
+              <a:ext cx="8139858" cy="5596152"/>
+            </a:xfrm>
+            <a:prstGeom prst="rect">
+              <a:avLst/>
+            </a:prstGeom>
+          </p:spPr>
+        </p:pic>
+        <p:sp>
+          <p:nvSpPr>
+            <p:cNvPr id="10" name="TextBox 9"/>
+            <p:cNvSpPr txBox="1"/>
+            <p:nvPr/>
+          </p:nvSpPr>
+          <p:spPr>
+            <a:xfrm>
+              <a:off x="3294417" y="15197830"/>
+              <a:ext cx="10007600" cy="707886"/>
+            </a:xfrm>
+            <a:prstGeom prst="rect">
+              <a:avLst/>
+            </a:prstGeom>
+            <a:noFill/>
+          </p:spPr>
+          <p:txBody>
+            <a:bodyPr wrap="square" rtlCol="0">
+              <a:spAutoFit/>
+            </a:bodyPr>
+            <a:lstStyle/>
+            <a:p>
+              <a:r>
+                <a:rPr lang="en-US" sz="4000" dirty="0" smtClean="0">
+                  <a:latin typeface="Century Gothic" charset="0"/>
+                  <a:ea typeface="Century Gothic" charset="0"/>
+                  <a:cs typeface="Century Gothic" charset="0"/>
+                </a:rPr>
+                <a:t>Total word count over the years</a:t>
+              </a:r>
+              <a:endParaRPr lang="en-US" sz="4000" dirty="0">
+                <a:latin typeface="Century Gothic" charset="0"/>
+                <a:ea typeface="Century Gothic" charset="0"/>
+                <a:cs typeface="Century Gothic" charset="0"/>
+              </a:endParaRPr>
+            </a:p>
+          </p:txBody>
+        </p:sp>
+      </p:grpSp>
+      <p:grpSp>
+        <p:nvGrpSpPr>
+          <p:cNvPr id="21" name="Group 20"/>
+          <p:cNvGrpSpPr/>
+          <p:nvPr/>
+        </p:nvGrpSpPr>
+        <p:grpSpPr>
+          <a:xfrm>
+            <a:off x="20377544" y="10626790"/>
+            <a:ext cx="8838023" cy="7994645"/>
+            <a:chOff x="18612383" y="11679862"/>
+            <a:chExt cx="8838023" cy="7994645"/>
+          </a:xfrm>
+        </p:grpSpPr>
+        <p:sp>
+          <p:nvSpPr>
+            <p:cNvPr id="20" name="TextBox 19"/>
+            <p:cNvSpPr txBox="1"/>
+            <p:nvPr/>
+          </p:nvSpPr>
+          <p:spPr>
+            <a:xfrm>
+              <a:off x="18612383" y="11679862"/>
+              <a:ext cx="8016502" cy="1323439"/>
+            </a:xfrm>
+            <a:prstGeom prst="rect">
+              <a:avLst/>
+            </a:prstGeom>
+            <a:noFill/>
+          </p:spPr>
+          <p:txBody>
+            <a:bodyPr wrap="square" rtlCol="0">
+              <a:spAutoFit/>
+            </a:bodyPr>
+            <a:lstStyle/>
+            <a:p>
+              <a:r>
+                <a:rPr lang="en-US" sz="4000" dirty="0" smtClean="0">
+                  <a:latin typeface="Century Gothic" charset="0"/>
+                  <a:ea typeface="Century Gothic" charset="0"/>
+                  <a:cs typeface="Century Gothic" charset="0"/>
+                </a:rPr>
+                <a:t>How much of the data was not extracted?</a:t>
+              </a:r>
+              <a:endParaRPr lang="en-US" sz="4000" dirty="0">
+                <a:latin typeface="Century Gothic" charset="0"/>
+                <a:ea typeface="Century Gothic" charset="0"/>
+                <a:cs typeface="Century Gothic" charset="0"/>
+              </a:endParaRPr>
+            </a:p>
+          </p:txBody>
+        </p:sp>
+        <p:pic>
+          <p:nvPicPr>
+            <p:cNvPr id="18" name="Picture 17"/>
+            <p:cNvPicPr>
+              <a:picLocks noChangeAspect="1"/>
+            </p:cNvPicPr>
+            <p:nvPr/>
+          </p:nvPicPr>
+          <p:blipFill>
+            <a:blip r:embed="rId6">
+              <a:extLst>
+                <a:ext uri="{28A0092B-C50C-407E-A947-70E740481C1C}">
+                  <a14:useLocalDpi xmlns:a14="http://schemas.microsoft.com/office/drawing/2010/main" val="0"/>
+                </a:ext>
+              </a:extLst>
+            </a:blip>
+            <a:stretch>
+              <a:fillRect/>
+            </a:stretch>
+          </p:blipFill>
+          <p:spPr>
+            <a:xfrm>
+              <a:off x="18612383" y="13598366"/>
+              <a:ext cx="8838023" cy="6076141"/>
+            </a:xfrm>
+            <a:prstGeom prst="rect">
+              <a:avLst/>
+            </a:prstGeom>
+          </p:spPr>
+        </p:pic>
+      </p:grpSp>
       <p:pic>
         <p:nvPicPr>
-          <p:cNvPr id="7" name="Picture 6"/>
+          <p:cNvPr id="24" name="Picture 23"/>
           <p:cNvPicPr>
             <a:picLocks noChangeAspect="1"/>
           </p:cNvPicPr>
           <p:nvPr/>
         </p:nvPicPr>
         <p:blipFill>
-          <a:blip r:embed="rId5">
+          <a:blip r:embed="rId7">
             <a:extLst>
               <a:ext uri="{28A0092B-C50C-407E-A947-70E740481C1C}">
                 <a14:useLocalDpi xmlns:a14="http://schemas.microsoft.com/office/drawing/2010/main" val="0"/>
@@ -4507,14 +4810,97 @@
         </p:blipFill>
         <p:spPr>
           <a:xfrm>
-            <a:off x="812114" y="12090400"/>
-            <a:ext cx="9079405" cy="6242091"/>
+            <a:off x="12165120" y="13281361"/>
+            <a:ext cx="6580288" cy="4523947"/>
           </a:xfrm>
           <a:prstGeom prst="rect">
             <a:avLst/>
           </a:prstGeom>
         </p:spPr>
       </p:pic>
+      <p:sp>
+        <p:nvSpPr>
+          <p:cNvPr id="26" name="TextBox 25"/>
+          <p:cNvSpPr txBox="1"/>
+          <p:nvPr/>
+        </p:nvSpPr>
+        <p:spPr>
+          <a:xfrm>
+            <a:off x="12165120" y="10606302"/>
+            <a:ext cx="7708161" cy="1938992"/>
+          </a:xfrm>
+          <a:prstGeom prst="rect">
+            <a:avLst/>
+          </a:prstGeom>
+          <a:noFill/>
+        </p:spPr>
+        <p:txBody>
+          <a:bodyPr wrap="square" rtlCol="0">
+            <a:spAutoFit/>
+          </a:bodyPr>
+          <a:lstStyle/>
+          <a:p>
+            <a:r>
+              <a:rPr lang="en-US" sz="4000" dirty="0" smtClean="0">
+                <a:latin typeface="Century Gothic" charset="0"/>
+                <a:ea typeface="Century Gothic" charset="0"/>
+                <a:cs typeface="Century Gothic" charset="0"/>
+              </a:rPr>
+              <a:t>Long Tail Distribution of words:</a:t>
+            </a:r>
+          </a:p>
+          <a:p>
+            <a:r>
+              <a:rPr lang="en-US" sz="4000" dirty="0" smtClean="0">
+                <a:latin typeface="Century Gothic" charset="0"/>
+                <a:ea typeface="Century Gothic" charset="0"/>
+                <a:cs typeface="Century Gothic" charset="0"/>
+              </a:rPr>
+              <a:t>Due to our cutoff, we miss a part of the data:</a:t>
+            </a:r>
+            <a:endParaRPr lang="en-US" sz="4000" dirty="0">
+              <a:latin typeface="Century Gothic" charset="0"/>
+              <a:ea typeface="Century Gothic" charset="0"/>
+              <a:cs typeface="Century Gothic" charset="0"/>
+            </a:endParaRPr>
+          </a:p>
+        </p:txBody>
+      </p:sp>
+      <p:cxnSp>
+        <p:nvCxnSpPr>
+          <p:cNvPr id="27" name="Straight Connector 26"/>
+          <p:cNvCxnSpPr/>
+          <p:nvPr/>
+        </p:nvCxnSpPr>
+        <p:spPr>
+          <a:xfrm flipH="1">
+            <a:off x="11151053" y="10296545"/>
+            <a:ext cx="74953" cy="8324890"/>
+          </a:xfrm>
+          <a:prstGeom prst="line">
+            <a:avLst/>
+          </a:prstGeom>
+          <a:ln>
+            <a:solidFill>
+              <a:schemeClr val="accent3"/>
+            </a:solidFill>
+          </a:ln>
+        </p:spPr>
+        <p:style>
+          <a:lnRef idx="1">
+            <a:schemeClr val="accent1"/>
+          </a:lnRef>
+          <a:fillRef idx="0">
+            <a:schemeClr val="accent1"/>
+          </a:fillRef>
+          <a:effectRef idx="0">
+            <a:schemeClr val="accent1"/>
+          </a:effectRef>
+          <a:fontRef idx="minor">
+            <a:schemeClr val="tx1"/>
+          </a:fontRef>
+        </p:style>
+      </p:cxnSp>
     </p:spTree>
     <p:extLst>
       <p:ext uri="{BB962C8B-B14F-4D97-AF65-F5344CB8AC3E}">

</xml_diff>

<commit_message>
adding my part of the presentation
</commit_message>
<xml_diff>
--- a/Presentation/Final_ADA.pptx
+++ b/Presentation/Final_ADA.pptx
@@ -254,7 +254,7 @@
           <a:p>
             <a:fld id="{C764DE79-268F-4C1A-8933-263129D2AF90}" type="datetimeFigureOut">
               <a:rPr lang="en-US" dirty="0"/>
-              <a:t>1/27/17</a:t>
+              <a:t>1/29/17</a:t>
             </a:fld>
             <a:endParaRPr lang="en-US" dirty="0"/>
           </a:p>
@@ -424,7 +424,7 @@
           <a:p>
             <a:fld id="{C764DE79-268F-4C1A-8933-263129D2AF90}" type="datetimeFigureOut">
               <a:rPr lang="en-US" dirty="0"/>
-              <a:t>1/27/17</a:t>
+              <a:t>1/29/17</a:t>
             </a:fld>
             <a:endParaRPr lang="en-US" dirty="0"/>
           </a:p>
@@ -604,7 +604,7 @@
           <a:p>
             <a:fld id="{C764DE79-268F-4C1A-8933-263129D2AF90}" type="datetimeFigureOut">
               <a:rPr lang="en-US" dirty="0"/>
-              <a:t>1/27/17</a:t>
+              <a:t>1/29/17</a:t>
             </a:fld>
             <a:endParaRPr lang="en-US" dirty="0"/>
           </a:p>
@@ -804,7 +804,7 @@
           <a:p>
             <a:fld id="{C764DE79-268F-4C1A-8933-263129D2AF90}" type="datetimeFigureOut">
               <a:rPr lang="en-US" dirty="0"/>
-              <a:t>1/27/17</a:t>
+              <a:t>1/29/17</a:t>
             </a:fld>
             <a:endParaRPr lang="en-US" dirty="0"/>
           </a:p>
@@ -1048,7 +1048,7 @@
           <a:p>
             <a:fld id="{C764DE79-268F-4C1A-8933-263129D2AF90}" type="datetimeFigureOut">
               <a:rPr lang="en-US" dirty="0"/>
-              <a:t>1/27/17</a:t>
+              <a:t>1/29/17</a:t>
             </a:fld>
             <a:endParaRPr lang="en-US" dirty="0"/>
           </a:p>
@@ -1280,7 +1280,7 @@
           <a:p>
             <a:fld id="{C764DE79-268F-4C1A-8933-263129D2AF90}" type="datetimeFigureOut">
               <a:rPr lang="en-US" dirty="0"/>
-              <a:t>1/27/17</a:t>
+              <a:t>1/29/17</a:t>
             </a:fld>
             <a:endParaRPr lang="en-US" dirty="0"/>
           </a:p>
@@ -1647,7 +1647,7 @@
           <a:p>
             <a:fld id="{C764DE79-268F-4C1A-8933-263129D2AF90}" type="datetimeFigureOut">
               <a:rPr lang="en-US" dirty="0"/>
-              <a:t>1/27/17</a:t>
+              <a:t>1/29/17</a:t>
             </a:fld>
             <a:endParaRPr lang="en-US" dirty="0"/>
           </a:p>
@@ -1765,7 +1765,7 @@
           <a:p>
             <a:fld id="{C764DE79-268F-4C1A-8933-263129D2AF90}" type="datetimeFigureOut">
               <a:rPr lang="en-US" dirty="0"/>
-              <a:t>1/27/17</a:t>
+              <a:t>1/29/17</a:t>
             </a:fld>
             <a:endParaRPr lang="en-US" dirty="0"/>
           </a:p>
@@ -1860,7 +1860,7 @@
           <a:p>
             <a:fld id="{C764DE79-268F-4C1A-8933-263129D2AF90}" type="datetimeFigureOut">
               <a:rPr lang="en-US" dirty="0"/>
-              <a:t>1/27/17</a:t>
+              <a:t>1/29/17</a:t>
             </a:fld>
             <a:endParaRPr lang="en-US" dirty="0"/>
           </a:p>
@@ -2137,7 +2137,7 @@
           <a:p>
             <a:fld id="{C764DE79-268F-4C1A-8933-263129D2AF90}" type="datetimeFigureOut">
               <a:rPr lang="en-US" dirty="0"/>
-              <a:t>1/27/17</a:t>
+              <a:t>1/29/17</a:t>
             </a:fld>
             <a:endParaRPr lang="en-US" dirty="0"/>
           </a:p>
@@ -2394,7 +2394,7 @@
           <a:p>
             <a:fld id="{C764DE79-268F-4C1A-8933-263129D2AF90}" type="datetimeFigureOut">
               <a:rPr lang="en-US" dirty="0"/>
-              <a:t>1/27/17</a:t>
+              <a:t>1/29/17</a:t>
             </a:fld>
             <a:endParaRPr lang="en-US" dirty="0"/>
           </a:p>
@@ -2607,7 +2607,7 @@
           <a:p>
             <a:fld id="{C764DE79-268F-4C1A-8933-263129D2AF90}" type="datetimeFigureOut">
               <a:rPr lang="en-US" dirty="0"/>
-              <a:t>1/27/17</a:t>
+              <a:t>1/29/17</a:t>
             </a:fld>
             <a:endParaRPr lang="en-US" dirty="0"/>
           </a:p>
@@ -3013,6 +3013,36 @@
           <a:chExt cx="0" cy="0"/>
         </a:xfrm>
       </p:grpSpPr>
+      <p:pic>
+        <p:nvPicPr>
+          <p:cNvPr id="24" name="Picture 23"/>
+          <p:cNvPicPr>
+            <a:picLocks noChangeAspect="1"/>
+          </p:cNvPicPr>
+          <p:nvPr/>
+        </p:nvPicPr>
+        <p:blipFill>
+          <a:blip r:embed="rId2">
+            <a:extLst>
+              <a:ext uri="{28A0092B-C50C-407E-A947-70E740481C1C}">
+                <a14:useLocalDpi xmlns:a14="http://schemas.microsoft.com/office/drawing/2010/main" val="0"/>
+              </a:ext>
+            </a:extLst>
+          </a:blip>
+          <a:stretch>
+            <a:fillRect/>
+          </a:stretch>
+        </p:blipFill>
+        <p:spPr>
+          <a:xfrm>
+            <a:off x="21845934" y="4643388"/>
+            <a:ext cx="6372664" cy="4381205"/>
+          </a:xfrm>
+          <a:prstGeom prst="rect">
+            <a:avLst/>
+          </a:prstGeom>
+        </p:spPr>
+      </p:pic>
       <p:sp>
         <p:nvSpPr>
           <p:cNvPr id="3" name="Rectangle 2"/>
@@ -3342,7 +3372,7 @@
           <p:nvPr/>
         </p:nvPicPr>
         <p:blipFill>
-          <a:blip r:embed="rId2">
+          <a:blip r:embed="rId3">
             <a:extLst>
               <a:ext uri="{28A0092B-C50C-407E-A947-70E740481C1C}">
                 <a14:useLocalDpi xmlns:a14="http://schemas.microsoft.com/office/drawing/2010/main" val="0"/>
@@ -3383,7 +3413,7 @@
           <p:nvPr/>
         </p:nvPicPr>
         <p:blipFill>
-          <a:blip r:embed="rId3">
+          <a:blip r:embed="rId4">
             <a:extLst>
               <a:ext uri="{28A0092B-C50C-407E-A947-70E740481C1C}">
                 <a14:useLocalDpi xmlns:a14="http://schemas.microsoft.com/office/drawing/2010/main" val="0"/>
@@ -3396,7 +3426,7 @@
         </p:blipFill>
         <p:spPr>
           <a:xfrm>
-            <a:off x="888657" y="6598327"/>
+            <a:off x="844413" y="6503994"/>
             <a:ext cx="5323030" cy="738044"/>
           </a:xfrm>
           <a:prstGeom prst="rect">
@@ -3412,8 +3442,8 @@
         </p:nvSpPr>
         <p:spPr>
           <a:xfrm>
-            <a:off x="16381862" y="2260600"/>
-            <a:ext cx="13360401" cy="8956298"/>
+            <a:off x="12659033" y="3083133"/>
+            <a:ext cx="8803968" cy="6924973"/>
           </a:xfrm>
           <a:prstGeom prst="rect">
             <a:avLst/>
@@ -3432,14 +3462,29 @@
               </a:buClr>
             </a:pPr>
             <a:r>
-              <a:rPr lang="fr-CH" sz="4800" b="1" dirty="0" smtClean="0">
-                <a:solidFill>
-                  <a:srgbClr val="333333"/>
-                </a:solidFill>
-                <a:latin typeface="Century Gothic"/>
-              </a:rPr>
-              <a:t>Data Extraction:</a:t>
-            </a:r>
+              <a:rPr lang="fr-CH" sz="4000" b="1" dirty="0" smtClean="0">
+                <a:solidFill>
+                  <a:srgbClr val="333333"/>
+                </a:solidFill>
+                <a:latin typeface="Century Gothic"/>
+              </a:rPr>
+              <a:t>Data </a:t>
+            </a:r>
+            <a:r>
+              <a:rPr lang="fr-CH" sz="4000" b="1" dirty="0" smtClean="0">
+                <a:solidFill>
+                  <a:srgbClr val="333333"/>
+                </a:solidFill>
+                <a:latin typeface="Century Gothic"/>
+              </a:rPr>
+              <a:t>Extraction</a:t>
+            </a:r>
+            <a:endParaRPr lang="fr-CH" sz="4000" b="1" dirty="0" smtClean="0">
+              <a:solidFill>
+                <a:srgbClr val="333333"/>
+              </a:solidFill>
+              <a:latin typeface="Century Gothic"/>
+            </a:endParaRPr>
           </a:p>
           <a:p>
             <a:pPr marL="914400" indent="-914400">
@@ -3450,7 +3495,7 @@
               <a:buAutoNum type="arabicPeriod"/>
             </a:pPr>
             <a:r>
-              <a:rPr lang="fr-CH" sz="4000" dirty="0" err="1" smtClean="0">
+              <a:rPr lang="fr-CH" sz="2800" dirty="0" err="1" smtClean="0">
                 <a:solidFill>
                   <a:srgbClr val="333333"/>
                 </a:solidFill>
@@ -3459,7 +3504,7 @@
               <a:t>Removal</a:t>
             </a:r>
             <a:r>
-              <a:rPr lang="fr-CH" sz="4000" dirty="0" smtClean="0">
+              <a:rPr lang="fr-CH" sz="2800" dirty="0" smtClean="0">
                 <a:solidFill>
                   <a:srgbClr val="333333"/>
                 </a:solidFill>
@@ -3468,7 +3513,7 @@
               <a:t> of </a:t>
             </a:r>
             <a:r>
-              <a:rPr lang="fr-CH" sz="4000" dirty="0" err="1" smtClean="0">
+              <a:rPr lang="fr-CH" sz="2800" dirty="0" err="1" smtClean="0">
                 <a:solidFill>
                   <a:srgbClr val="333333"/>
                 </a:solidFill>
@@ -3476,7 +3521,7 @@
               </a:rPr>
               <a:t>punctuation</a:t>
             </a:r>
-            <a:endParaRPr lang="fr-CH" sz="4000" dirty="0" smtClean="0">
+            <a:endParaRPr lang="fr-CH" sz="2800" dirty="0" smtClean="0">
               <a:solidFill>
                 <a:srgbClr val="333333"/>
               </a:solidFill>
@@ -3492,7 +3537,7 @@
               <a:buAutoNum type="arabicPeriod"/>
             </a:pPr>
             <a:r>
-              <a:rPr lang="fr-CH" sz="4000" dirty="0" err="1" smtClean="0">
+              <a:rPr lang="fr-CH" sz="2800" dirty="0" err="1" smtClean="0">
                 <a:solidFill>
                   <a:srgbClr val="333333"/>
                 </a:solidFill>
@@ -3501,7 +3546,7 @@
               <a:t>Removal</a:t>
             </a:r>
             <a:r>
-              <a:rPr lang="fr-CH" sz="4000" dirty="0" smtClean="0">
+              <a:rPr lang="fr-CH" sz="2800" dirty="0" smtClean="0">
                 <a:solidFill>
                   <a:srgbClr val="333333"/>
                 </a:solidFill>
@@ -3510,7 +3555,7 @@
               <a:t> of French stop </a:t>
             </a:r>
             <a:r>
-              <a:rPr lang="fr-CH" sz="4000" dirty="0" err="1" smtClean="0">
+              <a:rPr lang="fr-CH" sz="2800" dirty="0" err="1" smtClean="0">
                 <a:solidFill>
                   <a:srgbClr val="333333"/>
                 </a:solidFill>
@@ -3518,7 +3563,7 @@
               </a:rPr>
               <a:t>words</a:t>
             </a:r>
-            <a:endParaRPr lang="fr-CH" sz="4000" dirty="0" smtClean="0">
+            <a:endParaRPr lang="fr-CH" sz="2800" dirty="0" smtClean="0">
               <a:solidFill>
                 <a:srgbClr val="333333"/>
               </a:solidFill>
@@ -3534,7 +3579,7 @@
               <a:buAutoNum type="arabicPeriod"/>
             </a:pPr>
             <a:r>
-              <a:rPr lang="fr-CH" sz="4000" dirty="0" smtClean="0">
+              <a:rPr lang="fr-CH" sz="2800" dirty="0" smtClean="0">
                 <a:solidFill>
                   <a:srgbClr val="333333"/>
                 </a:solidFill>
@@ -3543,7 +3588,7 @@
               <a:t>Custom NLTK </a:t>
             </a:r>
             <a:r>
-              <a:rPr lang="fr-CH" sz="4000" dirty="0" err="1" smtClean="0">
+              <a:rPr lang="fr-CH" sz="2800" dirty="0" err="1" smtClean="0">
                 <a:solidFill>
                   <a:srgbClr val="333333"/>
                 </a:solidFill>
@@ -3552,7 +3597,7 @@
               <a:t>processing</a:t>
             </a:r>
             <a:r>
-              <a:rPr lang="fr-CH" sz="4000" dirty="0" smtClean="0">
+              <a:rPr lang="fr-CH" sz="2800" dirty="0" smtClean="0">
                 <a:solidFill>
                   <a:srgbClr val="333333"/>
                 </a:solidFill>
@@ -3570,7 +3615,7 @@
               <a:buChar char="•"/>
             </a:pPr>
             <a:r>
-              <a:rPr lang="fr-CH" sz="4000" dirty="0" err="1" smtClean="0">
+              <a:rPr lang="fr-CH" sz="2800" dirty="0" err="1" smtClean="0">
                 <a:solidFill>
                   <a:srgbClr val="333333"/>
                 </a:solidFill>
@@ -3579,7 +3624,7 @@
               <a:t>Singular</a:t>
             </a:r>
             <a:r>
-              <a:rPr lang="fr-CH" sz="4000" dirty="0" smtClean="0">
+              <a:rPr lang="fr-CH" sz="2800" dirty="0" smtClean="0">
                 <a:solidFill>
                   <a:srgbClr val="333333"/>
                 </a:solidFill>
@@ -3597,7 +3642,7 @@
               <a:buChar char="•"/>
             </a:pPr>
             <a:r>
-              <a:rPr lang="fr-CH" sz="4000" dirty="0" smtClean="0">
+              <a:rPr lang="fr-CH" sz="2800" dirty="0" smtClean="0">
                 <a:solidFill>
                   <a:srgbClr val="333333"/>
                 </a:solidFill>
@@ -3615,7 +3660,7 @@
               <a:buChar char="•"/>
             </a:pPr>
             <a:r>
-              <a:rPr lang="fr-CH" sz="4000" dirty="0" err="1" smtClean="0">
+              <a:rPr lang="fr-CH" sz="2800" dirty="0" err="1" smtClean="0">
                 <a:solidFill>
                   <a:srgbClr val="333333"/>
                 </a:solidFill>
@@ -3624,7 +3669,7 @@
               <a:t>Verbs</a:t>
             </a:r>
             <a:r>
-              <a:rPr lang="fr-CH" sz="4000" dirty="0" smtClean="0">
+              <a:rPr lang="fr-CH" sz="2800" dirty="0" smtClean="0">
                 <a:solidFill>
                   <a:srgbClr val="333333"/>
                 </a:solidFill>
@@ -3633,7 +3678,7 @@
               <a:t> and </a:t>
             </a:r>
             <a:r>
-              <a:rPr lang="fr-CH" sz="4000" dirty="0" err="1" smtClean="0">
+              <a:rPr lang="fr-CH" sz="2800" dirty="0" err="1" smtClean="0">
                 <a:solidFill>
                   <a:srgbClr val="333333"/>
                 </a:solidFill>
@@ -3642,7 +3687,7 @@
               <a:t>their</a:t>
             </a:r>
             <a:r>
-              <a:rPr lang="fr-CH" sz="4000" dirty="0" smtClean="0">
+              <a:rPr lang="fr-CH" sz="2800" dirty="0" smtClean="0">
                 <a:solidFill>
                   <a:srgbClr val="333333"/>
                 </a:solidFill>
@@ -3651,7 +3696,7 @@
               <a:t> </a:t>
             </a:r>
             <a:r>
-              <a:rPr lang="fr-CH" sz="4000" dirty="0" err="1" smtClean="0">
+              <a:rPr lang="fr-CH" sz="2800" dirty="0" err="1" smtClean="0">
                 <a:solidFill>
                   <a:srgbClr val="333333"/>
                 </a:solidFill>
@@ -3660,7 +3705,7 @@
               <a:t>conjugations</a:t>
             </a:r>
             <a:r>
-              <a:rPr lang="fr-CH" sz="4000" dirty="0">
+              <a:rPr lang="fr-CH" sz="2800" dirty="0">
                 <a:solidFill>
                   <a:srgbClr val="333333"/>
                 </a:solidFill>
@@ -3678,7 +3723,7 @@
               <a:buChar char="•"/>
             </a:pPr>
             <a:r>
-              <a:rPr lang="fr-CH" sz="4000" dirty="0" err="1" smtClean="0">
+              <a:rPr lang="fr-CH" sz="2800" dirty="0" err="1" smtClean="0">
                 <a:solidFill>
                   <a:srgbClr val="333333"/>
                 </a:solidFill>
@@ -3687,22 +3732,13 @@
               <a:t>Adverbs</a:t>
             </a:r>
             <a:r>
-              <a:rPr lang="fr-CH" sz="4000" dirty="0" smtClean="0">
-                <a:solidFill>
-                  <a:srgbClr val="333333"/>
-                </a:solidFill>
-                <a:latin typeface="Century Gothic"/>
-              </a:rPr>
-              <a:t> + </a:t>
-            </a:r>
-            <a:r>
-              <a:rPr lang="fr-CH" sz="4000" dirty="0" smtClean="0">
-                <a:solidFill>
-                  <a:srgbClr val="333333"/>
-                </a:solidFill>
-                <a:latin typeface="Century Gothic"/>
-              </a:rPr>
-              <a:t>Noun</a:t>
+              <a:rPr lang="fr-CH" sz="2800" dirty="0" smtClean="0">
+                <a:solidFill>
+                  <a:srgbClr val="333333"/>
+                </a:solidFill>
+                <a:latin typeface="Century Gothic"/>
+              </a:rPr>
+              <a:t> + Noun</a:t>
             </a:r>
           </a:p>
           <a:p>
@@ -3714,7 +3750,7 @@
               <a:buAutoNum type="arabicPeriod"/>
             </a:pPr>
             <a:r>
-              <a:rPr lang="fr-CH" sz="4000" dirty="0" err="1" smtClean="0">
+              <a:rPr lang="fr-CH" sz="2800" dirty="0" err="1" smtClean="0">
                 <a:solidFill>
                   <a:srgbClr val="333333"/>
                 </a:solidFill>
@@ -3723,7 +3759,7 @@
               <a:t>Cutoff</a:t>
             </a:r>
             <a:r>
-              <a:rPr lang="fr-CH" sz="4000" dirty="0" smtClean="0">
+              <a:rPr lang="fr-CH" sz="2800" dirty="0" smtClean="0">
                 <a:solidFill>
                   <a:srgbClr val="333333"/>
                 </a:solidFill>
@@ -3732,7 +3768,7 @@
               <a:t> </a:t>
             </a:r>
             <a:r>
-              <a:rPr lang="fr-CH" sz="4000" dirty="0" err="1" smtClean="0">
+              <a:rPr lang="fr-CH" sz="2800" dirty="0" err="1" smtClean="0">
                 <a:solidFill>
                   <a:srgbClr val="333333"/>
                 </a:solidFill>
@@ -3741,7 +3777,7 @@
               <a:t>Frequency</a:t>
             </a:r>
             <a:r>
-              <a:rPr lang="fr-CH" sz="4000" dirty="0" smtClean="0">
+              <a:rPr lang="fr-CH" sz="2800" dirty="0" smtClean="0">
                 <a:solidFill>
                   <a:srgbClr val="333333"/>
                 </a:solidFill>
@@ -3750,7 +3786,7 @@
               <a:t>: </a:t>
             </a:r>
             <a:r>
-              <a:rPr lang="fr-CH" sz="4000" dirty="0" err="1" smtClean="0">
+              <a:rPr lang="fr-CH" sz="2800" dirty="0" err="1" smtClean="0">
                 <a:solidFill>
                   <a:srgbClr val="333333"/>
                 </a:solidFill>
@@ -3759,7 +3795,38 @@
               <a:t>Removal</a:t>
             </a:r>
             <a:r>
-              <a:rPr lang="fr-CH" sz="4000" dirty="0" smtClean="0">
+              <a:rPr lang="fr-CH" sz="2800" dirty="0" smtClean="0">
+                <a:solidFill>
+                  <a:srgbClr val="333333"/>
+                </a:solidFill>
+                <a:latin typeface="Century Gothic"/>
+              </a:rPr>
+              <a:t> of </a:t>
+            </a:r>
+            <a:r>
+              <a:rPr lang="fr-CH" sz="2800" dirty="0" err="1" smtClean="0">
+                <a:solidFill>
+                  <a:srgbClr val="333333"/>
+                </a:solidFill>
+                <a:latin typeface="Century Gothic"/>
+              </a:rPr>
+              <a:t>words</a:t>
+            </a:r>
+            <a:endParaRPr lang="fr-CH" sz="2800" dirty="0">
+              <a:solidFill>
+                <a:srgbClr val="333333"/>
+              </a:solidFill>
+              <a:latin typeface="Century Gothic"/>
+            </a:endParaRPr>
+          </a:p>
+          <a:p>
+            <a:pPr>
+              <a:buClr>
+                <a:srgbClr val="990000"/>
+              </a:buClr>
+            </a:pPr>
+            <a:r>
+              <a:rPr lang="fr-CH" sz="2800" dirty="0">
                 <a:solidFill>
                   <a:srgbClr val="333333"/>
                 </a:solidFill>
@@ -3768,25 +3835,25 @@
               <a:t> </a:t>
             </a:r>
             <a:r>
-              <a:rPr lang="fr-CH" sz="4000" dirty="0" smtClean="0">
-                <a:solidFill>
-                  <a:srgbClr val="333333"/>
-                </a:solidFill>
-                <a:latin typeface="Century Gothic"/>
-              </a:rPr>
-              <a:t>of </a:t>
-            </a:r>
-            <a:r>
-              <a:rPr lang="fr-CH" sz="4000" dirty="0" err="1" smtClean="0">
-                <a:solidFill>
-                  <a:srgbClr val="333333"/>
-                </a:solidFill>
-                <a:latin typeface="Century Gothic"/>
-              </a:rPr>
-              <a:t>words</a:t>
-            </a:r>
-            <a:r>
-              <a:rPr lang="fr-CH" sz="4000" dirty="0" smtClean="0">
+              <a:rPr lang="fr-CH" sz="2800" dirty="0" smtClean="0">
+                <a:solidFill>
+                  <a:srgbClr val="333333"/>
+                </a:solidFill>
+                <a:latin typeface="Century Gothic"/>
+              </a:rPr>
+              <a:t>        </a:t>
+            </a:r>
+            <a:r>
+              <a:rPr lang="fr-CH" sz="2800" dirty="0" err="1" smtClean="0">
+                <a:solidFill>
+                  <a:srgbClr val="333333"/>
+                </a:solidFill>
+                <a:latin typeface="Century Gothic"/>
+              </a:rPr>
+              <a:t>that</a:t>
+            </a:r>
+            <a:r>
+              <a:rPr lang="fr-CH" sz="2800" dirty="0" smtClean="0">
                 <a:solidFill>
                   <a:srgbClr val="333333"/>
                 </a:solidFill>
@@ -3795,16 +3862,34 @@
               <a:t> </a:t>
             </a:r>
             <a:r>
-              <a:rPr lang="fr-CH" sz="4000" dirty="0" err="1" smtClean="0">
-                <a:solidFill>
-                  <a:srgbClr val="333333"/>
-                </a:solidFill>
-                <a:latin typeface="Century Gothic"/>
-              </a:rPr>
-              <a:t>that</a:t>
-            </a:r>
-            <a:r>
-              <a:rPr lang="fr-CH" sz="4000" dirty="0" smtClean="0">
+              <a:rPr lang="fr-CH" sz="2800" dirty="0" err="1" smtClean="0">
+                <a:solidFill>
+                  <a:srgbClr val="333333"/>
+                </a:solidFill>
+                <a:latin typeface="Century Gothic"/>
+              </a:rPr>
+              <a:t>were</a:t>
+            </a:r>
+            <a:r>
+              <a:rPr lang="fr-CH" sz="2800" dirty="0" smtClean="0">
+                <a:solidFill>
+                  <a:srgbClr val="333333"/>
+                </a:solidFill>
+                <a:latin typeface="Century Gothic"/>
+              </a:rPr>
+              <a:t> not </a:t>
+            </a:r>
+            <a:r>
+              <a:rPr lang="fr-CH" sz="2800" dirty="0" err="1" smtClean="0">
+                <a:solidFill>
+                  <a:srgbClr val="333333"/>
+                </a:solidFill>
+                <a:latin typeface="Century Gothic"/>
+              </a:rPr>
+              <a:t>present</a:t>
+            </a:r>
+            <a:r>
+              <a:rPr lang="fr-CH" sz="2800" dirty="0" smtClean="0">
                 <a:solidFill>
                   <a:srgbClr val="333333"/>
                 </a:solidFill>
@@ -3813,43 +3898,7 @@
               <a:t> </a:t>
             </a:r>
             <a:r>
-              <a:rPr lang="fr-CH" sz="4000" dirty="0" err="1" smtClean="0">
-                <a:solidFill>
-                  <a:srgbClr val="333333"/>
-                </a:solidFill>
-                <a:latin typeface="Century Gothic"/>
-              </a:rPr>
-              <a:t>were</a:t>
-            </a:r>
-            <a:r>
-              <a:rPr lang="fr-CH" sz="4000" dirty="0" smtClean="0">
-                <a:solidFill>
-                  <a:srgbClr val="333333"/>
-                </a:solidFill>
-                <a:latin typeface="Century Gothic"/>
-              </a:rPr>
-              <a:t> not </a:t>
-            </a:r>
-            <a:r>
-              <a:rPr lang="fr-CH" sz="4000" dirty="0" err="1" smtClean="0">
-                <a:solidFill>
-                  <a:srgbClr val="333333"/>
-                </a:solidFill>
-                <a:latin typeface="Century Gothic"/>
-              </a:rPr>
-              <a:t>present</a:t>
-            </a:r>
-            <a:r>
-              <a:rPr lang="fr-CH" sz="4000" dirty="0" smtClean="0">
-                <a:solidFill>
-                  <a:srgbClr val="333333"/>
-                </a:solidFill>
-                <a:latin typeface="Century Gothic"/>
-              </a:rPr>
-              <a:t> </a:t>
-            </a:r>
-            <a:r>
-              <a:rPr lang="fr-CH" sz="4000" dirty="0" err="1" smtClean="0">
+              <a:rPr lang="fr-CH" sz="2800" dirty="0" err="1" smtClean="0">
                 <a:solidFill>
                   <a:srgbClr val="333333"/>
                 </a:solidFill>
@@ -3857,7 +3906,7 @@
               </a:rPr>
               <a:t>enough</a:t>
             </a:r>
-            <a:endParaRPr lang="fr-CH" sz="4000" dirty="0" smtClean="0">
+            <a:endParaRPr lang="fr-CH" sz="2800" dirty="0" smtClean="0">
               <a:solidFill>
                 <a:srgbClr val="333333"/>
               </a:solidFill>
@@ -3872,7 +3921,7 @@
               <a:buFont typeface="+mj-lt"/>
               <a:buAutoNum type="arabicPeriod"/>
             </a:pPr>
-            <a:endParaRPr lang="fr-CH" sz="4000" b="1" dirty="0">
+            <a:endParaRPr lang="fr-CH" sz="2800" b="1" dirty="0">
               <a:solidFill>
                 <a:srgbClr val="333333"/>
               </a:solidFill>
@@ -3886,7 +3935,7 @@
               </a:buClr>
             </a:pPr>
             <a:r>
-              <a:rPr lang="fr-CH" sz="4000" b="1" dirty="0" err="1" smtClean="0">
+              <a:rPr lang="fr-CH" sz="2800" b="1" dirty="0" err="1" smtClean="0">
                 <a:solidFill>
                   <a:srgbClr val="333333"/>
                 </a:solidFill>
@@ -3895,7 +3944,7 @@
               <a:t>Result</a:t>
             </a:r>
             <a:r>
-              <a:rPr lang="fr-CH" sz="4000" b="1" dirty="0" smtClean="0">
+              <a:rPr lang="fr-CH" sz="2800" b="1" dirty="0" smtClean="0">
                 <a:solidFill>
                   <a:srgbClr val="333333"/>
                 </a:solidFill>
@@ -3904,7 +3953,7 @@
               <a:t>: </a:t>
             </a:r>
             <a:r>
-              <a:rPr lang="fr-CH" sz="4000" dirty="0" smtClean="0">
+              <a:rPr lang="fr-CH" sz="2800" dirty="0" smtClean="0">
                 <a:solidFill>
                   <a:srgbClr val="333333"/>
                 </a:solidFill>
@@ -3913,7 +3962,7 @@
               <a:t>Time </a:t>
             </a:r>
             <a:r>
-              <a:rPr lang="fr-CH" sz="4000" dirty="0" err="1" smtClean="0">
+              <a:rPr lang="fr-CH" sz="2800" dirty="0" err="1" smtClean="0">
                 <a:solidFill>
                   <a:srgbClr val="333333"/>
                 </a:solidFill>
@@ -3922,7 +3971,7 @@
               <a:t>serie</a:t>
             </a:r>
             <a:r>
-              <a:rPr lang="fr-CH" sz="4000" dirty="0" smtClean="0">
+              <a:rPr lang="fr-CH" sz="2800" dirty="0" smtClean="0">
                 <a:solidFill>
                   <a:srgbClr val="333333"/>
                 </a:solidFill>
@@ -3931,7 +3980,7 @@
               <a:t> of the </a:t>
             </a:r>
             <a:r>
-              <a:rPr lang="fr-CH" sz="4000" dirty="0" err="1" smtClean="0">
+              <a:rPr lang="fr-CH" sz="2800" dirty="0" err="1" smtClean="0">
                 <a:solidFill>
                   <a:srgbClr val="333333"/>
                 </a:solidFill>
@@ -3940,7 +3989,7 @@
               <a:t>frequency</a:t>
             </a:r>
             <a:r>
-              <a:rPr lang="fr-CH" sz="4000" dirty="0" smtClean="0">
+              <a:rPr lang="fr-CH" sz="2800" dirty="0" smtClean="0">
                 <a:solidFill>
                   <a:srgbClr val="333333"/>
                 </a:solidFill>
@@ -3949,7 +3998,7 @@
               <a:t> of </a:t>
             </a:r>
             <a:r>
-              <a:rPr lang="fr-CH" sz="4000" dirty="0" err="1" smtClean="0">
+              <a:rPr lang="fr-CH" sz="2800" dirty="0" err="1" smtClean="0">
                 <a:solidFill>
                   <a:srgbClr val="333333"/>
                 </a:solidFill>
@@ -3958,7 +4007,7 @@
               <a:t>each</a:t>
             </a:r>
             <a:r>
-              <a:rPr lang="fr-CH" sz="4000" dirty="0" smtClean="0">
+              <a:rPr lang="fr-CH" sz="2800" dirty="0" smtClean="0">
                 <a:solidFill>
                   <a:srgbClr val="333333"/>
                 </a:solidFill>
@@ -3967,7 +4016,7 @@
               <a:t> </a:t>
             </a:r>
             <a:r>
-              <a:rPr lang="fr-CH" sz="4000" dirty="0" err="1" smtClean="0">
+              <a:rPr lang="fr-CH" sz="2800" dirty="0" err="1" smtClean="0">
                 <a:solidFill>
                   <a:srgbClr val="333333"/>
                 </a:solidFill>
@@ -3975,7 +4024,7 @@
               </a:rPr>
               <a:t>word</a:t>
             </a:r>
-            <a:endParaRPr lang="fr-CH" sz="4000" b="1" dirty="0" smtClean="0">
+            <a:endParaRPr lang="fr-CH" sz="2800" b="1" dirty="0" smtClean="0">
               <a:solidFill>
                 <a:srgbClr val="333333"/>
               </a:solidFill>
@@ -4022,8 +4071,8 @@
         </p:nvSpPr>
         <p:spPr>
           <a:xfrm>
-            <a:off x="888657" y="2260600"/>
-            <a:ext cx="13716000" cy="8340745"/>
+            <a:off x="844413" y="3083132"/>
+            <a:ext cx="12318657" cy="5878532"/>
           </a:xfrm>
           <a:prstGeom prst="rect">
             <a:avLst/>
@@ -4042,7 +4091,7 @@
               </a:buClr>
             </a:pPr>
             <a:r>
-              <a:rPr lang="fr-CH" sz="4800" b="1" dirty="0" smtClean="0">
+              <a:rPr lang="fr-CH" sz="4000" b="1" dirty="0" smtClean="0">
                 <a:solidFill>
                   <a:srgbClr val="333333"/>
                 </a:solidFill>
@@ -4051,7 +4100,7 @@
               <a:t>The </a:t>
             </a:r>
             <a:r>
-              <a:rPr lang="fr-CH" sz="4800" b="1" dirty="0" err="1" smtClean="0">
+              <a:rPr lang="fr-CH" sz="4000" b="1" dirty="0" err="1" smtClean="0">
                 <a:solidFill>
                   <a:srgbClr val="333333"/>
                 </a:solidFill>
@@ -4059,237 +4108,6 @@
               </a:rPr>
               <a:t>Dataset</a:t>
             </a:r>
-            <a:r>
-              <a:rPr lang="fr-CH" sz="4800" b="1" dirty="0" smtClean="0">
-                <a:solidFill>
-                  <a:srgbClr val="333333"/>
-                </a:solidFill>
-                <a:latin typeface="Century Gothic"/>
-              </a:rPr>
-              <a:t>:</a:t>
-            </a:r>
-          </a:p>
-          <a:p>
-            <a:pPr>
-              <a:buClr>
-                <a:srgbClr val="990000"/>
-              </a:buClr>
-            </a:pPr>
-            <a:r>
-              <a:rPr lang="fr-CH" sz="4000" dirty="0" smtClean="0">
-                <a:solidFill>
-                  <a:srgbClr val="333333"/>
-                </a:solidFill>
-                <a:latin typeface="Century Gothic"/>
-              </a:rPr>
-              <a:t>200 </a:t>
-            </a:r>
-            <a:r>
-              <a:rPr lang="fr-CH" sz="4000" dirty="0" err="1" smtClean="0">
-                <a:solidFill>
-                  <a:srgbClr val="333333"/>
-                </a:solidFill>
-                <a:latin typeface="Century Gothic"/>
-              </a:rPr>
-              <a:t>years</a:t>
-            </a:r>
-            <a:r>
-              <a:rPr lang="fr-CH" sz="4000" dirty="0" smtClean="0">
-                <a:solidFill>
-                  <a:srgbClr val="333333"/>
-                </a:solidFill>
-                <a:latin typeface="Century Gothic"/>
-              </a:rPr>
-              <a:t> of </a:t>
-            </a:r>
-            <a:r>
-              <a:rPr lang="fr-CH" sz="4000" dirty="0" err="1" smtClean="0">
-                <a:solidFill>
-                  <a:srgbClr val="333333"/>
-                </a:solidFill>
-                <a:latin typeface="Century Gothic"/>
-              </a:rPr>
-              <a:t>daily</a:t>
-            </a:r>
-            <a:r>
-              <a:rPr lang="fr-CH" sz="4000" dirty="0" smtClean="0">
-                <a:solidFill>
-                  <a:srgbClr val="333333"/>
-                </a:solidFill>
-                <a:latin typeface="Century Gothic"/>
-              </a:rPr>
-              <a:t> articles </a:t>
-            </a:r>
-            <a:r>
-              <a:rPr lang="fr-CH" sz="4000" dirty="0" err="1" smtClean="0">
-                <a:solidFill>
-                  <a:srgbClr val="333333"/>
-                </a:solidFill>
-                <a:latin typeface="Century Gothic"/>
-              </a:rPr>
-              <a:t>from</a:t>
-            </a:r>
-            <a:r>
-              <a:rPr lang="fr-CH" sz="4000" dirty="0" smtClean="0">
-                <a:solidFill>
-                  <a:srgbClr val="333333"/>
-                </a:solidFill>
-                <a:latin typeface="Century Gothic"/>
-              </a:rPr>
-              <a:t>:</a:t>
-            </a:r>
-          </a:p>
-          <a:p>
-            <a:pPr>
-              <a:buClr>
-                <a:srgbClr val="990000"/>
-              </a:buClr>
-            </a:pPr>
-            <a:endParaRPr lang="fr-CH" sz="4000" dirty="0">
-              <a:solidFill>
-                <a:srgbClr val="333333"/>
-              </a:solidFill>
-              <a:latin typeface="Century Gothic"/>
-            </a:endParaRPr>
-          </a:p>
-          <a:p>
-            <a:pPr>
-              <a:buClr>
-                <a:srgbClr val="990000"/>
-              </a:buClr>
-            </a:pPr>
-            <a:endParaRPr lang="fr-CH" sz="4000" dirty="0" smtClean="0">
-              <a:solidFill>
-                <a:srgbClr val="333333"/>
-              </a:solidFill>
-              <a:latin typeface="Century Gothic"/>
-            </a:endParaRPr>
-          </a:p>
-          <a:p>
-            <a:pPr>
-              <a:buClr>
-                <a:srgbClr val="990000"/>
-              </a:buClr>
-            </a:pPr>
-            <a:r>
-              <a:rPr lang="fr-CH" sz="4000" dirty="0" smtClean="0">
-                <a:solidFill>
-                  <a:srgbClr val="333333"/>
-                </a:solidFill>
-                <a:latin typeface="Century Gothic"/>
-              </a:rPr>
-              <a:t> 	                Publication dates: 1798 </a:t>
-            </a:r>
-            <a:r>
-              <a:rPr lang="mr-IN" sz="4000" dirty="0" smtClean="0">
-                <a:solidFill>
-                  <a:srgbClr val="333333"/>
-                </a:solidFill>
-                <a:latin typeface="Century Gothic"/>
-              </a:rPr>
-              <a:t>–</a:t>
-            </a:r>
-            <a:r>
-              <a:rPr lang="fr-CH" sz="4000" dirty="0" smtClean="0">
-                <a:solidFill>
-                  <a:srgbClr val="333333"/>
-                </a:solidFill>
-                <a:latin typeface="Century Gothic"/>
-              </a:rPr>
-              <a:t> 1998</a:t>
-            </a:r>
-          </a:p>
-          <a:p>
-            <a:pPr>
-              <a:buClr>
-                <a:srgbClr val="990000"/>
-              </a:buClr>
-            </a:pPr>
-            <a:endParaRPr lang="fr-CH" sz="4000" dirty="0">
-              <a:solidFill>
-                <a:srgbClr val="333333"/>
-              </a:solidFill>
-              <a:latin typeface="Century Gothic"/>
-            </a:endParaRPr>
-          </a:p>
-          <a:p>
-            <a:pPr>
-              <a:buClr>
-                <a:srgbClr val="990000"/>
-              </a:buClr>
-            </a:pPr>
-            <a:r>
-              <a:rPr lang="fr-CH" sz="4000" dirty="0" smtClean="0">
-                <a:solidFill>
-                  <a:srgbClr val="333333"/>
-                </a:solidFill>
-                <a:latin typeface="Century Gothic"/>
-              </a:rPr>
-              <a:t>	</a:t>
-            </a:r>
-          </a:p>
-          <a:p>
-            <a:pPr>
-              <a:buClr>
-                <a:srgbClr val="990000"/>
-              </a:buClr>
-            </a:pPr>
-            <a:r>
-              <a:rPr lang="fr-CH" sz="4000" dirty="0">
-                <a:solidFill>
-                  <a:srgbClr val="333333"/>
-                </a:solidFill>
-                <a:latin typeface="Century Gothic"/>
-              </a:rPr>
-              <a:t>	 </a:t>
-            </a:r>
-            <a:r>
-              <a:rPr lang="fr-CH" sz="4000" dirty="0" smtClean="0">
-                <a:solidFill>
-                  <a:srgbClr val="333333"/>
-                </a:solidFill>
-                <a:latin typeface="Century Gothic"/>
-              </a:rPr>
-              <a:t>               Publication dates: 1826 </a:t>
-            </a:r>
-            <a:r>
-              <a:rPr lang="mr-IN" sz="4000" dirty="0" smtClean="0">
-                <a:solidFill>
-                  <a:srgbClr val="333333"/>
-                </a:solidFill>
-                <a:latin typeface="Century Gothic"/>
-              </a:rPr>
-              <a:t>–</a:t>
-            </a:r>
-            <a:r>
-              <a:rPr lang="fr-CH" sz="4000" dirty="0" smtClean="0">
-                <a:solidFill>
-                  <a:srgbClr val="333333"/>
-                </a:solidFill>
-                <a:latin typeface="Century Gothic"/>
-              </a:rPr>
-              <a:t> 1998</a:t>
-            </a:r>
-          </a:p>
-          <a:p>
-            <a:pPr>
-              <a:buClr>
-                <a:srgbClr val="990000"/>
-              </a:buClr>
-            </a:pPr>
-            <a:endParaRPr lang="fr-CH" sz="4000" dirty="0">
-              <a:solidFill>
-                <a:srgbClr val="333333"/>
-              </a:solidFill>
-              <a:latin typeface="Century Gothic"/>
-            </a:endParaRPr>
-          </a:p>
-          <a:p>
-            <a:pPr>
-              <a:buClr>
-                <a:srgbClr val="990000"/>
-              </a:buClr>
-            </a:pPr>
             <a:endParaRPr lang="fr-CH" sz="4000" b="1" dirty="0" smtClean="0">
               <a:solidFill>
                 <a:srgbClr val="333333"/>
@@ -4304,7 +4122,235 @@
               </a:buClr>
             </a:pPr>
             <a:r>
-              <a:rPr lang="fr-CH" sz="4000" b="1" dirty="0" smtClean="0">
+              <a:rPr lang="fr-CH" sz="2800" dirty="0" smtClean="0">
+                <a:solidFill>
+                  <a:srgbClr val="333333"/>
+                </a:solidFill>
+                <a:latin typeface="Century Gothic"/>
+              </a:rPr>
+              <a:t>200 </a:t>
+            </a:r>
+            <a:r>
+              <a:rPr lang="fr-CH" sz="2800" dirty="0" err="1" smtClean="0">
+                <a:solidFill>
+                  <a:srgbClr val="333333"/>
+                </a:solidFill>
+                <a:latin typeface="Century Gothic"/>
+              </a:rPr>
+              <a:t>years</a:t>
+            </a:r>
+            <a:r>
+              <a:rPr lang="fr-CH" sz="2800" dirty="0" smtClean="0">
+                <a:solidFill>
+                  <a:srgbClr val="333333"/>
+                </a:solidFill>
+                <a:latin typeface="Century Gothic"/>
+              </a:rPr>
+              <a:t> of </a:t>
+            </a:r>
+            <a:r>
+              <a:rPr lang="fr-CH" sz="2800" dirty="0" err="1" smtClean="0">
+                <a:solidFill>
+                  <a:srgbClr val="333333"/>
+                </a:solidFill>
+                <a:latin typeface="Century Gothic"/>
+              </a:rPr>
+              <a:t>daily</a:t>
+            </a:r>
+            <a:r>
+              <a:rPr lang="fr-CH" sz="2800" dirty="0" smtClean="0">
+                <a:solidFill>
+                  <a:srgbClr val="333333"/>
+                </a:solidFill>
+                <a:latin typeface="Century Gothic"/>
+              </a:rPr>
+              <a:t> articles </a:t>
+            </a:r>
+            <a:r>
+              <a:rPr lang="fr-CH" sz="2800" dirty="0" err="1" smtClean="0">
+                <a:solidFill>
+                  <a:srgbClr val="333333"/>
+                </a:solidFill>
+                <a:latin typeface="Century Gothic"/>
+              </a:rPr>
+              <a:t>from</a:t>
+            </a:r>
+            <a:r>
+              <a:rPr lang="fr-CH" sz="2800" dirty="0" smtClean="0">
+                <a:solidFill>
+                  <a:srgbClr val="333333"/>
+                </a:solidFill>
+                <a:latin typeface="Century Gothic"/>
+              </a:rPr>
+              <a:t>:</a:t>
+            </a:r>
+          </a:p>
+          <a:p>
+            <a:pPr>
+              <a:buClr>
+                <a:srgbClr val="990000"/>
+              </a:buClr>
+            </a:pPr>
+            <a:endParaRPr lang="fr-CH" sz="2800" dirty="0">
+              <a:solidFill>
+                <a:srgbClr val="333333"/>
+              </a:solidFill>
+              <a:latin typeface="Century Gothic"/>
+            </a:endParaRPr>
+          </a:p>
+          <a:p>
+            <a:pPr>
+              <a:buClr>
+                <a:srgbClr val="990000"/>
+              </a:buClr>
+            </a:pPr>
+            <a:endParaRPr lang="fr-CH" sz="2800" dirty="0" smtClean="0">
+              <a:solidFill>
+                <a:srgbClr val="333333"/>
+              </a:solidFill>
+              <a:latin typeface="Century Gothic"/>
+            </a:endParaRPr>
+          </a:p>
+          <a:p>
+            <a:pPr>
+              <a:buClr>
+                <a:srgbClr val="990000"/>
+              </a:buClr>
+            </a:pPr>
+            <a:r>
+              <a:rPr lang="fr-CH" sz="2800" dirty="0" smtClean="0">
+                <a:solidFill>
+                  <a:srgbClr val="333333"/>
+                </a:solidFill>
+                <a:latin typeface="Century Gothic"/>
+              </a:rPr>
+              <a:t> 	                    Publication dates: 1798 </a:t>
+            </a:r>
+            <a:r>
+              <a:rPr lang="mr-IN" sz="2800" dirty="0" smtClean="0">
+                <a:solidFill>
+                  <a:srgbClr val="333333"/>
+                </a:solidFill>
+                <a:latin typeface="Century Gothic"/>
+              </a:rPr>
+              <a:t>–</a:t>
+            </a:r>
+            <a:r>
+              <a:rPr lang="fr-CH" sz="2800" dirty="0" smtClean="0">
+                <a:solidFill>
+                  <a:srgbClr val="333333"/>
+                </a:solidFill>
+                <a:latin typeface="Century Gothic"/>
+              </a:rPr>
+              <a:t> 1998</a:t>
+            </a:r>
+          </a:p>
+          <a:p>
+            <a:pPr>
+              <a:buClr>
+                <a:srgbClr val="990000"/>
+              </a:buClr>
+            </a:pPr>
+            <a:endParaRPr lang="fr-CH" sz="2800" dirty="0">
+              <a:solidFill>
+                <a:srgbClr val="333333"/>
+              </a:solidFill>
+              <a:latin typeface="Century Gothic"/>
+            </a:endParaRPr>
+          </a:p>
+          <a:p>
+            <a:pPr>
+              <a:buClr>
+                <a:srgbClr val="990000"/>
+              </a:buClr>
+            </a:pPr>
+            <a:r>
+              <a:rPr lang="fr-CH" sz="2800" dirty="0" smtClean="0">
+                <a:solidFill>
+                  <a:srgbClr val="333333"/>
+                </a:solidFill>
+                <a:latin typeface="Century Gothic"/>
+              </a:rPr>
+              <a:t>	</a:t>
+            </a:r>
+          </a:p>
+          <a:p>
+            <a:pPr>
+              <a:buClr>
+                <a:srgbClr val="990000"/>
+              </a:buClr>
+            </a:pPr>
+            <a:r>
+              <a:rPr lang="fr-CH" sz="2800" dirty="0">
+                <a:solidFill>
+                  <a:srgbClr val="333333"/>
+                </a:solidFill>
+                <a:latin typeface="Century Gothic"/>
+              </a:rPr>
+              <a:t>	 </a:t>
+            </a:r>
+            <a:r>
+              <a:rPr lang="fr-CH" sz="2800" dirty="0" smtClean="0">
+                <a:solidFill>
+                  <a:srgbClr val="333333"/>
+                </a:solidFill>
+                <a:latin typeface="Century Gothic"/>
+              </a:rPr>
+              <a:t>                   Publication dates: 1826 </a:t>
+            </a:r>
+            <a:r>
+              <a:rPr lang="mr-IN" sz="2800" dirty="0" smtClean="0">
+                <a:solidFill>
+                  <a:srgbClr val="333333"/>
+                </a:solidFill>
+                <a:latin typeface="Century Gothic"/>
+              </a:rPr>
+              <a:t>–</a:t>
+            </a:r>
+            <a:r>
+              <a:rPr lang="fr-CH" sz="2800" dirty="0" smtClean="0">
+                <a:solidFill>
+                  <a:srgbClr val="333333"/>
+                </a:solidFill>
+                <a:latin typeface="Century Gothic"/>
+              </a:rPr>
+              <a:t> 1998</a:t>
+            </a:r>
+          </a:p>
+          <a:p>
+            <a:pPr>
+              <a:buClr>
+                <a:srgbClr val="990000"/>
+              </a:buClr>
+            </a:pPr>
+            <a:endParaRPr lang="fr-CH" sz="2800" dirty="0">
+              <a:solidFill>
+                <a:srgbClr val="333333"/>
+              </a:solidFill>
+              <a:latin typeface="Century Gothic"/>
+            </a:endParaRPr>
+          </a:p>
+          <a:p>
+            <a:pPr>
+              <a:buClr>
+                <a:srgbClr val="990000"/>
+              </a:buClr>
+            </a:pPr>
+            <a:endParaRPr lang="fr-CH" sz="2800" b="1" dirty="0" smtClean="0">
+              <a:solidFill>
+                <a:srgbClr val="333333"/>
+              </a:solidFill>
+              <a:latin typeface="Century Gothic"/>
+            </a:endParaRPr>
+          </a:p>
+          <a:p>
+            <a:pPr>
+              <a:buClr>
+                <a:srgbClr val="990000"/>
+              </a:buClr>
+            </a:pPr>
+            <a:r>
+              <a:rPr lang="fr-CH" sz="2800" b="1" dirty="0" smtClean="0">
                 <a:solidFill>
                   <a:srgbClr val="333333"/>
                 </a:solidFill>
@@ -4313,7 +4359,7 @@
               <a:t>Extraction: </a:t>
             </a:r>
             <a:r>
-              <a:rPr lang="fr-CH" sz="4000" dirty="0" err="1" smtClean="0">
+              <a:rPr lang="fr-CH" sz="2800" dirty="0" err="1" smtClean="0">
                 <a:solidFill>
                   <a:srgbClr val="333333"/>
                 </a:solidFill>
@@ -4322,7 +4368,7 @@
               <a:t>Counting</a:t>
             </a:r>
             <a:r>
-              <a:rPr lang="fr-CH" sz="4000" dirty="0" smtClean="0">
+              <a:rPr lang="fr-CH" sz="2800" dirty="0" smtClean="0">
                 <a:solidFill>
                   <a:srgbClr val="333333"/>
                 </a:solidFill>
@@ -4331,7 +4377,7 @@
               <a:t> the 3000+ </a:t>
             </a:r>
             <a:r>
-              <a:rPr lang="fr-CH" sz="4000" dirty="0" err="1" smtClean="0">
+              <a:rPr lang="fr-CH" sz="2800" dirty="0" err="1" smtClean="0">
                 <a:solidFill>
                   <a:srgbClr val="333333"/>
                 </a:solidFill>
@@ -4340,7 +4386,7 @@
               <a:t>most</a:t>
             </a:r>
             <a:r>
-              <a:rPr lang="fr-CH" sz="4000" dirty="0" smtClean="0">
+              <a:rPr lang="fr-CH" sz="2800" dirty="0" smtClean="0">
                 <a:solidFill>
                   <a:srgbClr val="333333"/>
                 </a:solidFill>
@@ -4349,7 +4395,7 @@
               <a:t> </a:t>
             </a:r>
             <a:r>
-              <a:rPr lang="fr-CH" sz="4000" dirty="0" err="1" smtClean="0">
+              <a:rPr lang="fr-CH" sz="2800" dirty="0" err="1" smtClean="0">
                 <a:solidFill>
                   <a:srgbClr val="333333"/>
                 </a:solidFill>
@@ -4358,7 +4404,7 @@
               <a:t>frequent</a:t>
             </a:r>
             <a:r>
-              <a:rPr lang="fr-CH" sz="4000" dirty="0" smtClean="0">
+              <a:rPr lang="fr-CH" sz="2800" dirty="0" smtClean="0">
                 <a:solidFill>
                   <a:srgbClr val="333333"/>
                 </a:solidFill>
@@ -4367,7 +4413,7 @@
               <a:t> </a:t>
             </a:r>
             <a:r>
-              <a:rPr lang="fr-CH" sz="4000" dirty="0" err="1" smtClean="0">
+              <a:rPr lang="fr-CH" sz="2800" dirty="0" err="1" smtClean="0">
                 <a:solidFill>
                   <a:srgbClr val="333333"/>
                 </a:solidFill>
@@ -4376,7 +4422,7 @@
               <a:t>words</a:t>
             </a:r>
             <a:r>
-              <a:rPr lang="fr-CH" sz="4000" dirty="0" smtClean="0">
+              <a:rPr lang="fr-CH" sz="2800" dirty="0" smtClean="0">
                 <a:solidFill>
                   <a:srgbClr val="333333"/>
                 </a:solidFill>
@@ -4385,7 +4431,7 @@
               <a:t> per </a:t>
             </a:r>
             <a:r>
-              <a:rPr lang="fr-CH" sz="4000" dirty="0" err="1" smtClean="0">
+              <a:rPr lang="fr-CH" sz="2800" dirty="0" err="1" smtClean="0">
                 <a:solidFill>
                   <a:srgbClr val="333333"/>
                 </a:solidFill>
@@ -4393,7 +4439,7 @@
               </a:rPr>
               <a:t>month</a:t>
             </a:r>
-            <a:endParaRPr lang="fr-CH" sz="4000" b="1" dirty="0" smtClean="0">
+            <a:endParaRPr lang="fr-CH" sz="2800" b="1" dirty="0" smtClean="0">
               <a:solidFill>
                 <a:srgbClr val="333333"/>
               </a:solidFill>
@@ -4424,7 +4470,7 @@
           <p:nvPr/>
         </p:nvPicPr>
         <p:blipFill>
-          <a:blip r:embed="rId4">
+          <a:blip r:embed="rId5">
             <a:extLst>
               <a:ext uri="{28A0092B-C50C-407E-A947-70E740481C1C}">
                 <a14:useLocalDpi xmlns:a14="http://schemas.microsoft.com/office/drawing/2010/main" val="0"/>
@@ -4438,7 +4484,7 @@
         </p:blipFill>
         <p:spPr bwMode="auto">
           <a:xfrm>
-            <a:off x="888657" y="4468735"/>
+            <a:off x="888657" y="4729630"/>
             <a:ext cx="5070474" cy="1382943"/>
           </a:xfrm>
           <a:prstGeom prst="rect">
@@ -4464,8 +4510,8 @@
         </p:nvCxnSpPr>
         <p:spPr>
           <a:xfrm>
-            <a:off x="15137606" y="1727200"/>
-            <a:ext cx="0" cy="8569345"/>
+            <a:off x="12414009" y="3103531"/>
+            <a:ext cx="35202" cy="5403198"/>
           </a:xfrm>
           <a:prstGeom prst="line">
             <a:avLst/>
@@ -4499,8 +4545,8 @@
         </p:nvCxnSpPr>
         <p:spPr>
           <a:xfrm>
-            <a:off x="-1" y="10296545"/>
-            <a:ext cx="30275214" cy="0"/>
+            <a:off x="380315" y="8993120"/>
+            <a:ext cx="29388485" cy="31473"/>
           </a:xfrm>
           <a:prstGeom prst="line">
             <a:avLst/>
@@ -4534,8 +4580,8 @@
         </p:nvSpPr>
         <p:spPr>
           <a:xfrm>
-            <a:off x="380315" y="10563164"/>
-            <a:ext cx="10770738" cy="1569660"/>
+            <a:off x="782074" y="9427559"/>
+            <a:ext cx="5817518" cy="830997"/>
           </a:xfrm>
           <a:prstGeom prst="rect">
             <a:avLst/>
@@ -4556,7 +4602,7 @@
             <a:r>
               <a:rPr lang="fr-CH" sz="4800" b="1" dirty="0" smtClean="0">
                 <a:solidFill>
-                  <a:srgbClr val="333333"/>
+                  <a:srgbClr val="990100"/>
                 </a:solidFill>
                 <a:latin typeface="Century Gothic"/>
               </a:rPr>
@@ -4565,57 +4611,15 @@
             <a:r>
               <a:rPr lang="fr-CH" sz="4800" b="1" dirty="0" err="1" smtClean="0">
                 <a:solidFill>
-                  <a:srgbClr val="333333"/>
+                  <a:srgbClr val="990100"/>
                 </a:solidFill>
                 <a:latin typeface="Century Gothic"/>
               </a:rPr>
               <a:t>Visualization</a:t>
             </a:r>
-            <a:r>
-              <a:rPr lang="fr-CH" sz="4800" b="1" dirty="0" smtClean="0">
-                <a:solidFill>
-                  <a:srgbClr val="333333"/>
-                </a:solidFill>
-                <a:latin typeface="Century Gothic"/>
-              </a:rPr>
-              <a:t> and </a:t>
-            </a:r>
-            <a:r>
-              <a:rPr lang="fr-CH" sz="4800" b="1" dirty="0" err="1" smtClean="0">
-                <a:solidFill>
-                  <a:srgbClr val="333333"/>
-                </a:solidFill>
-                <a:latin typeface="Century Gothic"/>
-              </a:rPr>
-              <a:t>Processing</a:t>
-            </a:r>
-            <a:r>
-              <a:rPr lang="fr-CH" sz="4800" b="1" dirty="0" smtClean="0">
-                <a:solidFill>
-                  <a:srgbClr val="333333"/>
-                </a:solidFill>
-                <a:latin typeface="Century Gothic"/>
-              </a:rPr>
-              <a:t>:</a:t>
-            </a:r>
-            <a:endParaRPr lang="fr-CH" sz="4000" dirty="0" smtClean="0">
+            <a:endParaRPr lang="fr-CH" sz="4800" dirty="0" smtClean="0">
               <a:solidFill>
-                <a:srgbClr val="333333"/>
-              </a:solidFill>
-              <a:latin typeface="Century Gothic"/>
-            </a:endParaRPr>
-          </a:p>
-          <a:p>
-            <a:pPr marL="914400" indent="-914400">
-              <a:buClr>
-                <a:srgbClr val="990000"/>
-              </a:buClr>
-              <a:buFont typeface="+mj-lt"/>
-              <a:buAutoNum type="arabicPeriod"/>
-            </a:pPr>
-            <a:endParaRPr lang="fr-CH" sz="4800" b="1" dirty="0">
-              <a:solidFill>
-                <a:srgbClr val="333333"/>
+                <a:srgbClr val="990100"/>
               </a:solidFill>
               <a:latin typeface="Century Gothic"/>
             </a:endParaRPr>
@@ -4630,136 +4634,15 @@
         </p:nvGrpSpPr>
         <p:grpSpPr>
           <a:xfrm>
-            <a:off x="380315" y="11692629"/>
-            <a:ext cx="10007600" cy="6304039"/>
-            <a:chOff x="3294417" y="15197830"/>
-            <a:chExt cx="10007600" cy="6304039"/>
+            <a:off x="1142082" y="10627127"/>
+            <a:ext cx="11608682" cy="6534721"/>
+            <a:chOff x="4056184" y="15399344"/>
+            <a:chExt cx="11608682" cy="6534721"/>
           </a:xfrm>
         </p:grpSpPr>
         <p:pic>
           <p:nvPicPr>
             <p:cNvPr id="7" name="Picture 6"/>
-            <p:cNvPicPr>
-              <a:picLocks noChangeAspect="1"/>
-            </p:cNvPicPr>
-            <p:nvPr/>
-          </p:nvPicPr>
-          <p:blipFill>
-            <a:blip r:embed="rId5">
-              <a:extLst>
-                <a:ext uri="{28A0092B-C50C-407E-A947-70E740481C1C}">
-                  <a14:useLocalDpi xmlns:a14="http://schemas.microsoft.com/office/drawing/2010/main" val="0"/>
-                </a:ext>
-              </a:extLst>
-            </a:blip>
-            <a:stretch>
-              <a:fillRect/>
-            </a:stretch>
-          </p:blipFill>
-          <p:spPr>
-            <a:xfrm>
-              <a:off x="3758515" y="15905717"/>
-              <a:ext cx="8139858" cy="5596152"/>
-            </a:xfrm>
-            <a:prstGeom prst="rect">
-              <a:avLst/>
-            </a:prstGeom>
-          </p:spPr>
-        </p:pic>
-        <p:sp>
-          <p:nvSpPr>
-            <p:cNvPr id="10" name="TextBox 9"/>
-            <p:cNvSpPr txBox="1"/>
-            <p:nvPr/>
-          </p:nvSpPr>
-          <p:spPr>
-            <a:xfrm>
-              <a:off x="3294417" y="15197830"/>
-              <a:ext cx="10007600" cy="707886"/>
-            </a:xfrm>
-            <a:prstGeom prst="rect">
-              <a:avLst/>
-            </a:prstGeom>
-            <a:noFill/>
-          </p:spPr>
-          <p:txBody>
-            <a:bodyPr wrap="square" rtlCol="0">
-              <a:spAutoFit/>
-            </a:bodyPr>
-            <a:lstStyle/>
-            <a:p>
-              <a:r>
-                <a:rPr lang="en-US" sz="4000" dirty="0" smtClean="0">
-                  <a:latin typeface="Century Gothic" charset="0"/>
-                  <a:ea typeface="Century Gothic" charset="0"/>
-                  <a:cs typeface="Century Gothic" charset="0"/>
-                </a:rPr>
-                <a:t>Total word count over the years</a:t>
-              </a:r>
-              <a:endParaRPr lang="en-US" sz="4000" dirty="0">
-                <a:latin typeface="Century Gothic" charset="0"/>
-                <a:ea typeface="Century Gothic" charset="0"/>
-                <a:cs typeface="Century Gothic" charset="0"/>
-              </a:endParaRPr>
-            </a:p>
-          </p:txBody>
-        </p:sp>
-      </p:grpSp>
-      <p:grpSp>
-        <p:nvGrpSpPr>
-          <p:cNvPr id="21" name="Group 20"/>
-          <p:cNvGrpSpPr/>
-          <p:nvPr/>
-        </p:nvGrpSpPr>
-        <p:grpSpPr>
-          <a:xfrm>
-            <a:off x="20377544" y="10626790"/>
-            <a:ext cx="8838023" cy="7994645"/>
-            <a:chOff x="18612383" y="11679862"/>
-            <a:chExt cx="8838023" cy="7994645"/>
-          </a:xfrm>
-        </p:grpSpPr>
-        <p:sp>
-          <p:nvSpPr>
-            <p:cNvPr id="20" name="TextBox 19"/>
-            <p:cNvSpPr txBox="1"/>
-            <p:nvPr/>
-          </p:nvSpPr>
-          <p:spPr>
-            <a:xfrm>
-              <a:off x="18612383" y="11679862"/>
-              <a:ext cx="8016502" cy="1323439"/>
-            </a:xfrm>
-            <a:prstGeom prst="rect">
-              <a:avLst/>
-            </a:prstGeom>
-            <a:noFill/>
-          </p:spPr>
-          <p:txBody>
-            <a:bodyPr wrap="square" rtlCol="0">
-              <a:spAutoFit/>
-            </a:bodyPr>
-            <a:lstStyle/>
-            <a:p>
-              <a:r>
-                <a:rPr lang="en-US" sz="4000" dirty="0" smtClean="0">
-                  <a:latin typeface="Century Gothic" charset="0"/>
-                  <a:ea typeface="Century Gothic" charset="0"/>
-                  <a:cs typeface="Century Gothic" charset="0"/>
-                </a:rPr>
-                <a:t>How much of the data was not extracted?</a:t>
-              </a:r>
-              <a:endParaRPr lang="en-US" sz="4000" dirty="0">
-                <a:latin typeface="Century Gothic" charset="0"/>
-                <a:ea typeface="Century Gothic" charset="0"/>
-                <a:cs typeface="Century Gothic" charset="0"/>
-              </a:endParaRPr>
-            </a:p>
-          </p:txBody>
-        </p:sp>
-        <p:pic>
-          <p:nvPicPr>
-            <p:cNvPr id="18" name="Picture 17"/>
             <p:cNvPicPr>
               <a:picLocks noChangeAspect="1"/>
             </p:cNvPicPr>
@@ -4779,55 +4662,63 @@
           </p:blipFill>
           <p:spPr>
             <a:xfrm>
-              <a:off x="18612383" y="13598366"/>
-              <a:ext cx="8838023" cy="6076141"/>
+              <a:off x="4056184" y="15922564"/>
+              <a:ext cx="8744003" cy="6011501"/>
             </a:xfrm>
             <a:prstGeom prst="rect">
               <a:avLst/>
             </a:prstGeom>
           </p:spPr>
         </p:pic>
+        <p:sp>
+          <p:nvSpPr>
+            <p:cNvPr id="10" name="TextBox 9"/>
+            <p:cNvSpPr txBox="1"/>
+            <p:nvPr/>
+          </p:nvSpPr>
+          <p:spPr>
+            <a:xfrm>
+              <a:off x="5657266" y="15399344"/>
+              <a:ext cx="10007600" cy="523220"/>
+            </a:xfrm>
+            <a:prstGeom prst="rect">
+              <a:avLst/>
+            </a:prstGeom>
+            <a:noFill/>
+          </p:spPr>
+          <p:txBody>
+            <a:bodyPr wrap="square" rtlCol="0">
+              <a:spAutoFit/>
+            </a:bodyPr>
+            <a:lstStyle/>
+            <a:p>
+              <a:r>
+                <a:rPr lang="en-US" sz="2800" dirty="0" smtClean="0">
+                  <a:latin typeface="Century Gothic" charset="0"/>
+                  <a:ea typeface="Century Gothic" charset="0"/>
+                  <a:cs typeface="Century Gothic" charset="0"/>
+                </a:rPr>
+                <a:t>Total word count over the years</a:t>
+              </a:r>
+              <a:endParaRPr lang="en-US" sz="2800" dirty="0">
+                <a:latin typeface="Century Gothic" charset="0"/>
+                <a:ea typeface="Century Gothic" charset="0"/>
+                <a:cs typeface="Century Gothic" charset="0"/>
+              </a:endParaRPr>
+            </a:p>
+          </p:txBody>
+        </p:sp>
       </p:grpSp>
-      <p:pic>
-        <p:nvPicPr>
-          <p:cNvPr id="24" name="Picture 23"/>
-          <p:cNvPicPr>
-            <a:picLocks noChangeAspect="1"/>
-          </p:cNvPicPr>
+      <p:sp>
+        <p:nvSpPr>
+          <p:cNvPr id="20" name="TextBox 19"/>
+          <p:cNvSpPr txBox="1"/>
           <p:nvPr/>
-        </p:nvPicPr>
-        <p:blipFill>
-          <a:blip r:embed="rId7">
-            <a:extLst>
-              <a:ext uri="{28A0092B-C50C-407E-A947-70E740481C1C}">
-                <a14:useLocalDpi xmlns:a14="http://schemas.microsoft.com/office/drawing/2010/main" val="0"/>
-              </a:ext>
-            </a:extLst>
-          </a:blip>
-          <a:stretch>
-            <a:fillRect/>
-          </a:stretch>
-        </p:blipFill>
+        </p:nvSpPr>
         <p:spPr>
           <a:xfrm>
-            <a:off x="12165120" y="13281361"/>
-            <a:ext cx="6580288" cy="4523947"/>
-          </a:xfrm>
-          <a:prstGeom prst="rect">
-            <a:avLst/>
-          </a:prstGeom>
-        </p:spPr>
-      </p:pic>
-      <p:sp>
-        <p:nvSpPr>
-          <p:cNvPr id="26" name="TextBox 25"/>
-          <p:cNvSpPr txBox="1"/>
-          <p:nvPr/>
-        </p:nvSpPr>
-        <p:spPr>
-          <a:xfrm>
-            <a:off x="12165120" y="10606302"/>
-            <a:ext cx="7708161" cy="1938992"/>
+            <a:off x="10956000" y="9838143"/>
+            <a:ext cx="8821826" cy="1323439"/>
           </a:xfrm>
           <a:prstGeom prst="rect">
             <a:avLst/>
@@ -4841,24 +4732,65 @@
           <a:lstStyle/>
           <a:p>
             <a:r>
-              <a:rPr lang="en-US" sz="4000" dirty="0" smtClean="0">
+              <a:rPr lang="en-US" sz="4000" b="1" dirty="0" smtClean="0">
                 <a:latin typeface="Century Gothic" charset="0"/>
                 <a:ea typeface="Century Gothic" charset="0"/>
                 <a:cs typeface="Century Gothic" charset="0"/>
               </a:rPr>
-              <a:t>Long Tail Distribution of words:</a:t>
-            </a:r>
-          </a:p>
-          <a:p>
-            <a:r>
-              <a:rPr lang="en-US" sz="4000" dirty="0" smtClean="0">
+              <a:t>How much of the data was not extracted</a:t>
+            </a:r>
+            <a:r>
+              <a:rPr lang="en-US" sz="4000" b="1" dirty="0" smtClean="0">
                 <a:latin typeface="Century Gothic" charset="0"/>
                 <a:ea typeface="Century Gothic" charset="0"/>
                 <a:cs typeface="Century Gothic" charset="0"/>
               </a:rPr>
+              <a:t>?</a:t>
+            </a:r>
+          </a:p>
+        </p:txBody>
+      </p:sp>
+      <p:sp>
+        <p:nvSpPr>
+          <p:cNvPr id="26" name="TextBox 25"/>
+          <p:cNvSpPr txBox="1"/>
+          <p:nvPr/>
+        </p:nvSpPr>
+        <p:spPr>
+          <a:xfrm>
+            <a:off x="21845934" y="3236665"/>
+            <a:ext cx="7708161" cy="1384995"/>
+          </a:xfrm>
+          <a:prstGeom prst="rect">
+            <a:avLst/>
+          </a:prstGeom>
+          <a:noFill/>
+        </p:spPr>
+        <p:txBody>
+          <a:bodyPr wrap="square" rtlCol="0">
+            <a:spAutoFit/>
+          </a:bodyPr>
+          <a:lstStyle/>
+          <a:p>
+            <a:r>
+              <a:rPr lang="en-US" sz="2800" dirty="0" smtClean="0">
+                <a:latin typeface="Century Gothic" charset="0"/>
+                <a:ea typeface="Century Gothic" charset="0"/>
+                <a:cs typeface="Century Gothic" charset="0"/>
+              </a:rPr>
+              <a:t>Long Tail Distribution of words:</a:t>
+            </a:r>
+          </a:p>
+          <a:p>
+            <a:r>
+              <a:rPr lang="en-US" sz="2800" dirty="0" smtClean="0">
+                <a:latin typeface="Century Gothic" charset="0"/>
+                <a:ea typeface="Century Gothic" charset="0"/>
+                <a:cs typeface="Century Gothic" charset="0"/>
+              </a:rPr>
               <a:t>Due to our cutoff, we miss a part of the data:</a:t>
             </a:r>
-            <a:endParaRPr lang="en-US" sz="4000" dirty="0">
+            <a:endParaRPr lang="en-US" sz="2800" dirty="0">
               <a:latin typeface="Century Gothic" charset="0"/>
               <a:ea typeface="Century Gothic" charset="0"/>
               <a:cs typeface="Century Gothic" charset="0"/>
@@ -4873,9 +4805,9 @@
           <p:nvPr/>
         </p:nvCxnSpPr>
         <p:spPr>
-          <a:xfrm flipH="1">
-            <a:off x="11151053" y="10296545"/>
-            <a:ext cx="74953" cy="8324890"/>
+          <a:xfrm>
+            <a:off x="10619345" y="9843057"/>
+            <a:ext cx="81398" cy="7191624"/>
           </a:xfrm>
           <a:prstGeom prst="line">
             <a:avLst/>
@@ -4901,6 +4833,1173 @@
           </a:fontRef>
         </p:style>
       </p:cxnSp>
+      <p:grpSp>
+        <p:nvGrpSpPr>
+          <p:cNvPr id="8" name="Group 7"/>
+          <p:cNvGrpSpPr/>
+          <p:nvPr/>
+        </p:nvGrpSpPr>
+        <p:grpSpPr>
+          <a:xfrm>
+            <a:off x="21437189" y="9838143"/>
+            <a:ext cx="8838023" cy="7295499"/>
+            <a:chOff x="20232009" y="8610461"/>
+            <a:chExt cx="8838023" cy="7295499"/>
+          </a:xfrm>
+        </p:grpSpPr>
+        <p:pic>
+          <p:nvPicPr>
+            <p:cNvPr id="18" name="Picture 17"/>
+            <p:cNvPicPr>
+              <a:picLocks noChangeAspect="1"/>
+            </p:cNvPicPr>
+            <p:nvPr/>
+          </p:nvPicPr>
+          <p:blipFill>
+            <a:blip r:embed="rId7">
+              <a:extLst>
+                <a:ext uri="{28A0092B-C50C-407E-A947-70E740481C1C}">
+                  <a14:useLocalDpi xmlns:a14="http://schemas.microsoft.com/office/drawing/2010/main" val="0"/>
+                </a:ext>
+              </a:extLst>
+            </a:blip>
+            <a:stretch>
+              <a:fillRect/>
+            </a:stretch>
+          </p:blipFill>
+          <p:spPr>
+            <a:xfrm>
+              <a:off x="20232009" y="9829819"/>
+              <a:ext cx="8838023" cy="6076141"/>
+            </a:xfrm>
+            <a:prstGeom prst="rect">
+              <a:avLst/>
+            </a:prstGeom>
+          </p:spPr>
+        </p:pic>
+        <p:sp>
+          <p:nvSpPr>
+            <p:cNvPr id="23" name="TextBox 22"/>
+            <p:cNvSpPr txBox="1"/>
+            <p:nvPr/>
+          </p:nvSpPr>
+          <p:spPr>
+            <a:xfrm>
+              <a:off x="20457219" y="8610461"/>
+              <a:ext cx="8387601" cy="954107"/>
+            </a:xfrm>
+            <a:prstGeom prst="rect">
+              <a:avLst/>
+            </a:prstGeom>
+            <a:noFill/>
+          </p:spPr>
+          <p:txBody>
+            <a:bodyPr wrap="square" rtlCol="0">
+              <a:spAutoFit/>
+            </a:bodyPr>
+            <a:lstStyle/>
+            <a:p>
+              <a:pPr algn="ctr"/>
+              <a:r>
+                <a:rPr lang="en-US" sz="2800" dirty="0" smtClean="0">
+                  <a:latin typeface="Century Gothic" charset="0"/>
+                  <a:ea typeface="Century Gothic" charset="0"/>
+                  <a:cs typeface="Century Gothic" charset="0"/>
+                </a:rPr>
+                <a:t>Number of </a:t>
+              </a:r>
+              <a:r>
+                <a:rPr lang="en-US" sz="2800" dirty="0" err="1" smtClean="0">
+                  <a:latin typeface="Century Gothic" charset="0"/>
+                  <a:ea typeface="Century Gothic" charset="0"/>
+                  <a:cs typeface="Century Gothic" charset="0"/>
+                </a:rPr>
+                <a:t>occurences</a:t>
+              </a:r>
+              <a:r>
+                <a:rPr lang="en-US" sz="2800" dirty="0" smtClean="0">
+                  <a:latin typeface="Century Gothic" charset="0"/>
+                  <a:ea typeface="Century Gothic" charset="0"/>
+                  <a:cs typeface="Century Gothic" charset="0"/>
+                </a:rPr>
+                <a:t> of least frequent word with percentage of the data that was missed</a:t>
+              </a:r>
+              <a:endParaRPr lang="en-US" sz="2800" dirty="0">
+                <a:latin typeface="Century Gothic" charset="0"/>
+                <a:ea typeface="Century Gothic" charset="0"/>
+                <a:cs typeface="Century Gothic" charset="0"/>
+              </a:endParaRPr>
+            </a:p>
+          </p:txBody>
+        </p:sp>
+      </p:grpSp>
+      <p:pic>
+        <p:nvPicPr>
+          <p:cNvPr id="16" name="Picture 15"/>
+          <p:cNvPicPr>
+            <a:picLocks noChangeAspect="1"/>
+          </p:cNvPicPr>
+          <p:nvPr/>
+        </p:nvPicPr>
+        <p:blipFill>
+          <a:blip r:embed="rId8">
+            <a:extLst>
+              <a:ext uri="{28A0092B-C50C-407E-A947-70E740481C1C}">
+                <a14:useLocalDpi xmlns:a14="http://schemas.microsoft.com/office/drawing/2010/main" val="0"/>
+              </a:ext>
+            </a:extLst>
+          </a:blip>
+          <a:stretch>
+            <a:fillRect/>
+          </a:stretch>
+        </p:blipFill>
+        <p:spPr>
+          <a:xfrm>
+            <a:off x="16160713" y="11227464"/>
+            <a:ext cx="4750932" cy="3266265"/>
+          </a:xfrm>
+          <a:prstGeom prst="rect">
+            <a:avLst/>
+          </a:prstGeom>
+        </p:spPr>
+      </p:pic>
+      <p:sp>
+        <p:nvSpPr>
+          <p:cNvPr id="17" name="TextBox 16"/>
+          <p:cNvSpPr txBox="1"/>
+          <p:nvPr/>
+        </p:nvSpPr>
+        <p:spPr>
+          <a:xfrm>
+            <a:off x="11060867" y="11340815"/>
+            <a:ext cx="4814133" cy="5693866"/>
+          </a:xfrm>
+          <a:prstGeom prst="rect">
+            <a:avLst/>
+          </a:prstGeom>
+          <a:noFill/>
+        </p:spPr>
+        <p:txBody>
+          <a:bodyPr wrap="square" rtlCol="0">
+            <a:spAutoFit/>
+          </a:bodyPr>
+          <a:lstStyle/>
+          <a:p>
+            <a:pPr marL="457200" indent="-457200">
+              <a:buFont typeface="Arial" charset="0"/>
+              <a:buChar char="•"/>
+            </a:pPr>
+            <a:r>
+              <a:rPr lang="en-US" sz="2800" dirty="0">
+                <a:latin typeface="Century Gothic" charset="0"/>
+                <a:ea typeface="Century Gothic" charset="0"/>
+                <a:cs typeface="Century Gothic" charset="0"/>
+              </a:rPr>
+              <a:t>Power Law distribution </a:t>
+            </a:r>
+            <a:r>
+              <a:rPr lang="en-US" sz="2800" dirty="0" smtClean="0">
+                <a:latin typeface="Century Gothic" charset="0"/>
+                <a:ea typeface="Century Gothic" charset="0"/>
+                <a:cs typeface="Century Gothic" charset="0"/>
+              </a:rPr>
+              <a:t>is </a:t>
+            </a:r>
+          </a:p>
+          <a:p>
+            <a:r>
+              <a:rPr lang="en-US" sz="2800" dirty="0">
+                <a:latin typeface="Century Gothic" charset="0"/>
+                <a:ea typeface="Century Gothic" charset="0"/>
+                <a:cs typeface="Century Gothic" charset="0"/>
+              </a:rPr>
+              <a:t> </a:t>
+            </a:r>
+            <a:r>
+              <a:rPr lang="en-US" sz="2800" dirty="0" smtClean="0">
+                <a:latin typeface="Century Gothic" charset="0"/>
+                <a:ea typeface="Century Gothic" charset="0"/>
+                <a:cs typeface="Century Gothic" charset="0"/>
+              </a:rPr>
+              <a:t>    linear </a:t>
+            </a:r>
+            <a:r>
+              <a:rPr lang="en-US" sz="2800" dirty="0">
+                <a:latin typeface="Century Gothic" charset="0"/>
+                <a:ea typeface="Century Gothic" charset="0"/>
+                <a:cs typeface="Century Gothic" charset="0"/>
+              </a:rPr>
+              <a:t>in log-</a:t>
+            </a:r>
+            <a:r>
+              <a:rPr lang="en-US" sz="2800" dirty="0" err="1">
+                <a:latin typeface="Century Gothic" charset="0"/>
+                <a:ea typeface="Century Gothic" charset="0"/>
+                <a:cs typeface="Century Gothic" charset="0"/>
+              </a:rPr>
+              <a:t>lin</a:t>
+            </a:r>
+            <a:r>
+              <a:rPr lang="en-US" sz="2800" dirty="0">
+                <a:latin typeface="Century Gothic" charset="0"/>
+                <a:ea typeface="Century Gothic" charset="0"/>
+                <a:cs typeface="Century Gothic" charset="0"/>
+              </a:rPr>
+              <a:t> scale</a:t>
+            </a:r>
+          </a:p>
+          <a:p>
+            <a:pPr marL="457200" indent="-457200">
+              <a:buFont typeface="Arial" charset="0"/>
+              <a:buChar char="•"/>
+            </a:pPr>
+            <a:r>
+              <a:rPr lang="en-US" sz="2800" dirty="0">
+                <a:latin typeface="Century Gothic" charset="0"/>
+                <a:ea typeface="Century Gothic" charset="0"/>
+                <a:cs typeface="Century Gothic" charset="0"/>
+              </a:rPr>
+              <a:t>Linear Regression of the </a:t>
+            </a:r>
+            <a:endParaRPr lang="en-US" sz="2800" dirty="0" smtClean="0">
+              <a:latin typeface="Century Gothic" charset="0"/>
+              <a:ea typeface="Century Gothic" charset="0"/>
+              <a:cs typeface="Century Gothic" charset="0"/>
+            </a:endParaRPr>
+          </a:p>
+          <a:p>
+            <a:r>
+              <a:rPr lang="en-US" sz="2800" dirty="0">
+                <a:latin typeface="Century Gothic" charset="0"/>
+                <a:ea typeface="Century Gothic" charset="0"/>
+                <a:cs typeface="Century Gothic" charset="0"/>
+              </a:rPr>
+              <a:t> </a:t>
+            </a:r>
+            <a:r>
+              <a:rPr lang="en-US" sz="2800" dirty="0" smtClean="0">
+                <a:latin typeface="Century Gothic" charset="0"/>
+                <a:ea typeface="Century Gothic" charset="0"/>
+                <a:cs typeface="Century Gothic" charset="0"/>
+              </a:rPr>
+              <a:t>     distribution </a:t>
+            </a:r>
+            <a:r>
+              <a:rPr lang="en-US" sz="2800" dirty="0">
+                <a:latin typeface="Century Gothic" charset="0"/>
+                <a:ea typeface="Century Gothic" charset="0"/>
+                <a:cs typeface="Century Gothic" charset="0"/>
+              </a:rPr>
+              <a:t>to predict</a:t>
+            </a:r>
+          </a:p>
+          <a:p>
+            <a:r>
+              <a:rPr lang="en-US" sz="2800" dirty="0">
+                <a:latin typeface="Century Gothic" charset="0"/>
+                <a:ea typeface="Century Gothic" charset="0"/>
+                <a:cs typeface="Century Gothic" charset="0"/>
+              </a:rPr>
+              <a:t>     the non extracted part</a:t>
+            </a:r>
+          </a:p>
+          <a:p>
+            <a:r>
+              <a:rPr lang="en-US" sz="2800" dirty="0">
+                <a:latin typeface="Century Gothic" charset="0"/>
+                <a:ea typeface="Century Gothic" charset="0"/>
+                <a:cs typeface="Century Gothic" charset="0"/>
+              </a:rPr>
+              <a:t>      </a:t>
+            </a:r>
+            <a:endParaRPr lang="en-US" sz="2800" dirty="0" smtClean="0">
+              <a:latin typeface="Century Gothic" charset="0"/>
+              <a:ea typeface="Century Gothic" charset="0"/>
+              <a:cs typeface="Century Gothic" charset="0"/>
+            </a:endParaRPr>
+          </a:p>
+          <a:p>
+            <a:endParaRPr lang="en-US" sz="2800" dirty="0">
+              <a:latin typeface="Century Gothic" charset="0"/>
+              <a:ea typeface="Century Gothic" charset="0"/>
+              <a:cs typeface="Century Gothic" charset="0"/>
+            </a:endParaRPr>
+          </a:p>
+          <a:p>
+            <a:endParaRPr lang="en-US" sz="2800" dirty="0" smtClean="0">
+              <a:latin typeface="Century Gothic" charset="0"/>
+              <a:ea typeface="Century Gothic" charset="0"/>
+              <a:cs typeface="Century Gothic" charset="0"/>
+            </a:endParaRPr>
+          </a:p>
+          <a:p>
+            <a:endParaRPr lang="en-US" sz="2800" dirty="0">
+              <a:latin typeface="Century Gothic" charset="0"/>
+              <a:ea typeface="Century Gothic" charset="0"/>
+              <a:cs typeface="Century Gothic" charset="0"/>
+            </a:endParaRPr>
+          </a:p>
+          <a:p>
+            <a:endParaRPr lang="en-US" sz="2800" dirty="0" smtClean="0">
+              <a:latin typeface="Century Gothic" charset="0"/>
+              <a:ea typeface="Century Gothic" charset="0"/>
+              <a:cs typeface="Century Gothic" charset="0"/>
+            </a:endParaRPr>
+          </a:p>
+          <a:p>
+            <a:endParaRPr lang="en-US" sz="2800" dirty="0">
+              <a:latin typeface="Century Gothic" charset="0"/>
+              <a:ea typeface="Century Gothic" charset="0"/>
+              <a:cs typeface="Century Gothic" charset="0"/>
+            </a:endParaRPr>
+          </a:p>
+          <a:p>
+            <a:endParaRPr lang="en-US" sz="2800" dirty="0">
+              <a:latin typeface="Century Gothic" charset="0"/>
+              <a:ea typeface="Century Gothic" charset="0"/>
+              <a:cs typeface="Century Gothic" charset="0"/>
+            </a:endParaRPr>
+          </a:p>
+          <a:p>
+            <a:endParaRPr lang="en-US" sz="2800" dirty="0"/>
+          </a:p>
+        </p:txBody>
+      </p:sp>
+      <p:sp>
+        <p:nvSpPr>
+          <p:cNvPr id="22" name="TextBox 21"/>
+          <p:cNvSpPr txBox="1"/>
+          <p:nvPr/>
+        </p:nvSpPr>
+        <p:spPr>
+          <a:xfrm>
+            <a:off x="11363634" y="14959377"/>
+            <a:ext cx="10099367" cy="2677656"/>
+          </a:xfrm>
+          <a:prstGeom prst="rect">
+            <a:avLst/>
+          </a:prstGeom>
+          <a:noFill/>
+        </p:spPr>
+        <p:txBody>
+          <a:bodyPr wrap="square" rtlCol="0">
+            <a:spAutoFit/>
+          </a:bodyPr>
+          <a:lstStyle/>
+          <a:p>
+            <a:r>
+              <a:rPr lang="en-US" sz="2800" dirty="0">
+                <a:latin typeface="Century Gothic" charset="0"/>
+                <a:ea typeface="Century Gothic" charset="0"/>
+                <a:cs typeface="Century Gothic" charset="0"/>
+              </a:rPr>
+              <a:t>We can predict the percentage of the distribution</a:t>
+            </a:r>
+          </a:p>
+          <a:p>
+            <a:r>
+              <a:rPr lang="en-US" sz="2800" dirty="0" err="1">
+                <a:latin typeface="Century Gothic" charset="0"/>
+                <a:ea typeface="Century Gothic" charset="0"/>
+                <a:cs typeface="Century Gothic" charset="0"/>
+              </a:rPr>
+              <a:t>thst</a:t>
+            </a:r>
+            <a:r>
+              <a:rPr lang="en-US" sz="2800" dirty="0">
+                <a:latin typeface="Century Gothic" charset="0"/>
+                <a:ea typeface="Century Gothic" charset="0"/>
+                <a:cs typeface="Century Gothic" charset="0"/>
+              </a:rPr>
+              <a:t> we did not </a:t>
+            </a:r>
+            <a:r>
+              <a:rPr lang="en-US" sz="2800" dirty="0" smtClean="0">
+                <a:latin typeface="Century Gothic" charset="0"/>
+                <a:ea typeface="Century Gothic" charset="0"/>
+                <a:cs typeface="Century Gothic" charset="0"/>
+              </a:rPr>
+              <a:t>extract.</a:t>
+            </a:r>
+          </a:p>
+          <a:p>
+            <a:endParaRPr lang="en-US" sz="2800" dirty="0">
+              <a:latin typeface="Century Gothic" charset="0"/>
+              <a:ea typeface="Century Gothic" charset="0"/>
+              <a:cs typeface="Century Gothic" charset="0"/>
+            </a:endParaRPr>
+          </a:p>
+          <a:p>
+            <a:r>
+              <a:rPr lang="en-US" sz="2800" dirty="0" smtClean="0">
+                <a:latin typeface="Century Gothic" charset="0"/>
+                <a:ea typeface="Century Gothic" charset="0"/>
+                <a:cs typeface="Century Gothic" charset="0"/>
+              </a:rPr>
+              <a:t>We can see that in theory we did not miss an important </a:t>
+            </a:r>
+          </a:p>
+          <a:p>
+            <a:r>
+              <a:rPr lang="en-US" sz="2800" dirty="0" smtClean="0">
+                <a:latin typeface="Century Gothic" charset="0"/>
+                <a:ea typeface="Century Gothic" charset="0"/>
+                <a:cs typeface="Century Gothic" charset="0"/>
+              </a:rPr>
+              <a:t>part of the word distribution (graph on the right)</a:t>
+            </a:r>
+            <a:endParaRPr lang="en-US" sz="2800" dirty="0">
+              <a:latin typeface="Century Gothic" charset="0"/>
+              <a:ea typeface="Century Gothic" charset="0"/>
+              <a:cs typeface="Century Gothic" charset="0"/>
+            </a:endParaRPr>
+          </a:p>
+          <a:p>
+            <a:endParaRPr lang="en-US" sz="2800" dirty="0"/>
+          </a:p>
+        </p:txBody>
+      </p:sp>
+      <p:sp>
+        <p:nvSpPr>
+          <p:cNvPr id="37" name="TextBox 36"/>
+          <p:cNvSpPr txBox="1"/>
+          <p:nvPr/>
+        </p:nvSpPr>
+        <p:spPr>
+          <a:xfrm>
+            <a:off x="782074" y="2098675"/>
+            <a:ext cx="10770738" cy="830997"/>
+          </a:xfrm>
+          <a:prstGeom prst="rect">
+            <a:avLst/>
+          </a:prstGeom>
+          <a:noFill/>
+        </p:spPr>
+        <p:txBody>
+          <a:bodyPr wrap="square" rtlCol="0">
+            <a:spAutoFit/>
+          </a:bodyPr>
+          <a:lstStyle/>
+          <a:p>
+            <a:pPr>
+              <a:buClr>
+                <a:srgbClr val="990000"/>
+              </a:buClr>
+            </a:pPr>
+            <a:r>
+              <a:rPr lang="fr-CH" sz="4800" b="1" dirty="0" err="1" smtClean="0">
+                <a:solidFill>
+                  <a:srgbClr val="990100"/>
+                </a:solidFill>
+                <a:latin typeface="Century Gothic"/>
+              </a:rPr>
+              <a:t>Extract</a:t>
+            </a:r>
+            <a:r>
+              <a:rPr lang="fr-CH" sz="4800" b="1" dirty="0" smtClean="0">
+                <a:solidFill>
+                  <a:srgbClr val="990100"/>
+                </a:solidFill>
+                <a:latin typeface="Century Gothic"/>
+              </a:rPr>
+              <a:t> </a:t>
+            </a:r>
+            <a:r>
+              <a:rPr lang="fr-CH" sz="4800" b="1" dirty="0" err="1" smtClean="0">
+                <a:solidFill>
+                  <a:srgbClr val="990100"/>
+                </a:solidFill>
+                <a:latin typeface="Century Gothic"/>
+              </a:rPr>
+              <a:t>Transfom</a:t>
+            </a:r>
+            <a:r>
+              <a:rPr lang="fr-CH" sz="4800" b="1" dirty="0" smtClean="0">
+                <a:solidFill>
+                  <a:srgbClr val="990100"/>
+                </a:solidFill>
+                <a:latin typeface="Century Gothic"/>
+              </a:rPr>
+              <a:t> Pipeline</a:t>
+            </a:r>
+            <a:endParaRPr lang="fr-CH" sz="4800" dirty="0" smtClean="0">
+              <a:solidFill>
+                <a:srgbClr val="990100"/>
+              </a:solidFill>
+              <a:latin typeface="Century Gothic"/>
+            </a:endParaRPr>
+          </a:p>
+        </p:txBody>
+      </p:sp>
+      <p:sp>
+        <p:nvSpPr>
+          <p:cNvPr id="44" name="TextBox 43"/>
+          <p:cNvSpPr txBox="1"/>
+          <p:nvPr/>
+        </p:nvSpPr>
+        <p:spPr>
+          <a:xfrm>
+            <a:off x="888657" y="18053639"/>
+            <a:ext cx="8821826" cy="707886"/>
+          </a:xfrm>
+          <a:prstGeom prst="rect">
+            <a:avLst/>
+          </a:prstGeom>
+          <a:noFill/>
+        </p:spPr>
+        <p:txBody>
+          <a:bodyPr wrap="square" rtlCol="0">
+            <a:spAutoFit/>
+          </a:bodyPr>
+          <a:lstStyle/>
+          <a:p>
+            <a:r>
+              <a:rPr lang="en-US" sz="4000" b="1" dirty="0" smtClean="0">
+                <a:latin typeface="Century Gothic" charset="0"/>
+                <a:ea typeface="Century Gothic" charset="0"/>
+                <a:cs typeface="Century Gothic" charset="0"/>
+              </a:rPr>
+              <a:t>Words with interesting time series</a:t>
+            </a:r>
+          </a:p>
+        </p:txBody>
+      </p:sp>
+      <p:grpSp>
+        <p:nvGrpSpPr>
+          <p:cNvPr id="47" name="Group 46"/>
+          <p:cNvGrpSpPr/>
+          <p:nvPr/>
+        </p:nvGrpSpPr>
+        <p:grpSpPr>
+          <a:xfrm>
+            <a:off x="10956000" y="18965443"/>
+            <a:ext cx="6073715" cy="4685694"/>
+            <a:chOff x="11363634" y="19840490"/>
+            <a:chExt cx="6073715" cy="4685694"/>
+          </a:xfrm>
+        </p:grpSpPr>
+        <p:pic>
+          <p:nvPicPr>
+            <p:cNvPr id="42" name="Picture 41"/>
+            <p:cNvPicPr>
+              <a:picLocks noChangeAspect="1"/>
+            </p:cNvPicPr>
+            <p:nvPr/>
+          </p:nvPicPr>
+          <p:blipFill>
+            <a:blip r:embed="rId9">
+              <a:extLst>
+                <a:ext uri="{28A0092B-C50C-407E-A947-70E740481C1C}">
+                  <a14:useLocalDpi xmlns:a14="http://schemas.microsoft.com/office/drawing/2010/main" val="0"/>
+                </a:ext>
+              </a:extLst>
+            </a:blip>
+            <a:stretch>
+              <a:fillRect/>
+            </a:stretch>
+          </p:blipFill>
+          <p:spPr>
+            <a:xfrm>
+              <a:off x="11363634" y="20442842"/>
+              <a:ext cx="5939407" cy="4083342"/>
+            </a:xfrm>
+            <a:prstGeom prst="rect">
+              <a:avLst/>
+            </a:prstGeom>
+          </p:spPr>
+        </p:pic>
+        <p:sp>
+          <p:nvSpPr>
+            <p:cNvPr id="45" name="TextBox 44"/>
+            <p:cNvSpPr txBox="1"/>
+            <p:nvPr/>
+          </p:nvSpPr>
+          <p:spPr>
+            <a:xfrm>
+              <a:off x="11771268" y="19840490"/>
+              <a:ext cx="5666081" cy="524620"/>
+            </a:xfrm>
+            <a:prstGeom prst="rect">
+              <a:avLst/>
+            </a:prstGeom>
+            <a:noFill/>
+          </p:spPr>
+          <p:txBody>
+            <a:bodyPr wrap="square" rtlCol="0">
+              <a:spAutoFit/>
+            </a:bodyPr>
+            <a:lstStyle/>
+            <a:p>
+              <a:r>
+                <a:rPr lang="en-US" sz="2800" dirty="0" smtClean="0">
+                  <a:latin typeface="Century Gothic" charset="0"/>
+                  <a:ea typeface="Century Gothic" charset="0"/>
+                  <a:cs typeface="Century Gothic" charset="0"/>
+                </a:rPr>
+                <a:t>Words with monthly periodicity</a:t>
+              </a:r>
+              <a:endParaRPr lang="en-US" sz="2800" dirty="0">
+                <a:latin typeface="Century Gothic" charset="0"/>
+                <a:ea typeface="Century Gothic" charset="0"/>
+                <a:cs typeface="Century Gothic" charset="0"/>
+              </a:endParaRPr>
+            </a:p>
+          </p:txBody>
+        </p:sp>
+      </p:grpSp>
+      <p:sp>
+        <p:nvSpPr>
+          <p:cNvPr id="46" name="TextBox 45"/>
+          <p:cNvSpPr txBox="1"/>
+          <p:nvPr/>
+        </p:nvSpPr>
+        <p:spPr>
+          <a:xfrm>
+            <a:off x="844412" y="19008118"/>
+            <a:ext cx="9856331" cy="4401205"/>
+          </a:xfrm>
+          <a:prstGeom prst="rect">
+            <a:avLst/>
+          </a:prstGeom>
+          <a:noFill/>
+        </p:spPr>
+        <p:txBody>
+          <a:bodyPr wrap="square" rtlCol="0">
+            <a:spAutoFit/>
+          </a:bodyPr>
+          <a:lstStyle/>
+          <a:p>
+            <a:r>
+              <a:rPr lang="en-US" sz="2800" dirty="0" smtClean="0">
+                <a:latin typeface="Century Gothic" charset="0"/>
+                <a:ea typeface="Century Gothic" charset="0"/>
+                <a:cs typeface="Century Gothic" charset="0"/>
+              </a:rPr>
+              <a:t>To find relevant time series, several methods were used:</a:t>
+            </a:r>
+          </a:p>
+          <a:p>
+            <a:pPr marL="457200" indent="-457200">
+              <a:buFont typeface="Arial" charset="0"/>
+              <a:buChar char="•"/>
+            </a:pPr>
+            <a:r>
+              <a:rPr lang="en-US" sz="2800" dirty="0" smtClean="0">
+                <a:latin typeface="Century Gothic" charset="0"/>
+                <a:ea typeface="Century Gothic" charset="0"/>
+                <a:cs typeface="Century Gothic" charset="0"/>
+              </a:rPr>
+              <a:t>Pearson Correlation : computing similarity between word</a:t>
+            </a:r>
+          </a:p>
+          <a:p>
+            <a:pPr marL="457200" indent="-457200">
+              <a:buFont typeface="Arial" charset="0"/>
+              <a:buChar char="•"/>
+            </a:pPr>
+            <a:r>
+              <a:rPr lang="en-US" sz="2800" dirty="0" smtClean="0">
+                <a:latin typeface="Century Gothic" charset="0"/>
+                <a:ea typeface="Century Gothic" charset="0"/>
+                <a:cs typeface="Century Gothic" charset="0"/>
+              </a:rPr>
+              <a:t>Fourier Transform : Finding words with periodicity</a:t>
+            </a:r>
+          </a:p>
+          <a:p>
+            <a:pPr marL="457200" indent="-457200">
+              <a:buFont typeface="Arial" charset="0"/>
+              <a:buChar char="•"/>
+            </a:pPr>
+            <a:r>
+              <a:rPr lang="en-US" sz="2800" dirty="0" smtClean="0">
+                <a:latin typeface="Century Gothic" charset="0"/>
+                <a:ea typeface="Century Gothic" charset="0"/>
+                <a:cs typeface="Century Gothic" charset="0"/>
+              </a:rPr>
+              <a:t>Gradient : Finding decreasing and increasing time series</a:t>
+            </a:r>
+            <a:endParaRPr lang="en-US" sz="2800" dirty="0">
+              <a:latin typeface="Century Gothic" charset="0"/>
+              <a:ea typeface="Century Gothic" charset="0"/>
+              <a:cs typeface="Century Gothic" charset="0"/>
+            </a:endParaRPr>
+          </a:p>
+          <a:p>
+            <a:pPr marL="457200" indent="-457200">
+              <a:buFont typeface="Arial" charset="0"/>
+              <a:buChar char="•"/>
+            </a:pPr>
+            <a:r>
+              <a:rPr lang="en-US" sz="2800" dirty="0" err="1" smtClean="0">
+                <a:latin typeface="Century Gothic" charset="0"/>
+                <a:ea typeface="Century Gothic" charset="0"/>
+                <a:cs typeface="Century Gothic" charset="0"/>
+              </a:rPr>
+              <a:t>Dendogram</a:t>
+            </a:r>
+            <a:r>
+              <a:rPr lang="en-US" sz="2800" dirty="0" smtClean="0">
+                <a:latin typeface="Century Gothic" charset="0"/>
+                <a:ea typeface="Century Gothic" charset="0"/>
+                <a:cs typeface="Century Gothic" charset="0"/>
+              </a:rPr>
+              <a:t> clustering</a:t>
+            </a:r>
+          </a:p>
+          <a:p>
+            <a:pPr marL="457200" indent="-457200">
+              <a:buFont typeface="Arial" charset="0"/>
+              <a:buChar char="•"/>
+            </a:pPr>
+            <a:r>
+              <a:rPr lang="en-US" sz="2800" dirty="0" smtClean="0">
+                <a:latin typeface="Century Gothic" charset="0"/>
+                <a:ea typeface="Century Gothic" charset="0"/>
+                <a:cs typeface="Century Gothic" charset="0"/>
+              </a:rPr>
+              <a:t>Frequency ranking</a:t>
+            </a:r>
+          </a:p>
+          <a:p>
+            <a:pPr marL="457200" indent="-457200">
+              <a:buFont typeface="Arial" charset="0"/>
+              <a:buChar char="•"/>
+            </a:pPr>
+            <a:r>
+              <a:rPr lang="en-US" sz="2800" dirty="0" smtClean="0">
+                <a:latin typeface="Century Gothic" charset="0"/>
+                <a:ea typeface="Century Gothic" charset="0"/>
+                <a:cs typeface="Century Gothic" charset="0"/>
+              </a:rPr>
+              <a:t>Manual Search</a:t>
+            </a:r>
+          </a:p>
+          <a:p>
+            <a:pPr marL="457200" indent="-457200">
+              <a:buFont typeface="Arial" charset="0"/>
+              <a:buChar char="•"/>
+            </a:pPr>
+            <a:r>
+              <a:rPr lang="en-US" sz="2800" dirty="0" smtClean="0">
+                <a:latin typeface="Century Gothic" charset="0"/>
+                <a:ea typeface="Century Gothic" charset="0"/>
+                <a:cs typeface="Century Gothic" charset="0"/>
+              </a:rPr>
+              <a:t>Search of the smoothed out series (rolling mean)</a:t>
+            </a:r>
+          </a:p>
+        </p:txBody>
+      </p:sp>
+      <p:pic>
+        <p:nvPicPr>
+          <p:cNvPr id="48" name="Picture 47"/>
+          <p:cNvPicPr>
+            <a:picLocks noChangeAspect="1"/>
+          </p:cNvPicPr>
+          <p:nvPr/>
+        </p:nvPicPr>
+        <p:blipFill>
+          <a:blip r:embed="rId10">
+            <a:extLst>
+              <a:ext uri="{28A0092B-C50C-407E-A947-70E740481C1C}">
+                <a14:useLocalDpi xmlns:a14="http://schemas.microsoft.com/office/drawing/2010/main" val="0"/>
+              </a:ext>
+            </a:extLst>
+          </a:blip>
+          <a:stretch>
+            <a:fillRect/>
+          </a:stretch>
+        </p:blipFill>
+        <p:spPr>
+          <a:xfrm>
+            <a:off x="17614557" y="19567796"/>
+            <a:ext cx="5939405" cy="4083342"/>
+          </a:xfrm>
+          <a:prstGeom prst="rect">
+            <a:avLst/>
+          </a:prstGeom>
+        </p:spPr>
+      </p:pic>
+      <p:sp>
+        <p:nvSpPr>
+          <p:cNvPr id="50" name="TextBox 49"/>
+          <p:cNvSpPr txBox="1"/>
+          <p:nvPr/>
+        </p:nvSpPr>
+        <p:spPr>
+          <a:xfrm>
+            <a:off x="17614557" y="18966843"/>
+            <a:ext cx="5981917" cy="523220"/>
+          </a:xfrm>
+          <a:prstGeom prst="rect">
+            <a:avLst/>
+          </a:prstGeom>
+          <a:noFill/>
+        </p:spPr>
+        <p:txBody>
+          <a:bodyPr wrap="square" rtlCol="0">
+            <a:spAutoFit/>
+          </a:bodyPr>
+          <a:lstStyle/>
+          <a:p>
+            <a:r>
+              <a:rPr lang="en-US" sz="2800" dirty="0" smtClean="0">
+                <a:latin typeface="Century Gothic" charset="0"/>
+                <a:ea typeface="Century Gothic" charset="0"/>
+                <a:cs typeface="Century Gothic" charset="0"/>
+              </a:rPr>
+              <a:t>Words with </a:t>
+            </a:r>
+            <a:r>
+              <a:rPr lang="en-US" sz="2800" smtClean="0">
+                <a:latin typeface="Century Gothic" charset="0"/>
+                <a:ea typeface="Century Gothic" charset="0"/>
+                <a:cs typeface="Century Gothic" charset="0"/>
+              </a:rPr>
+              <a:t>multi year periodicity</a:t>
+            </a:r>
+            <a:endParaRPr lang="en-US" sz="2800" dirty="0">
+              <a:latin typeface="Century Gothic" charset="0"/>
+              <a:ea typeface="Century Gothic" charset="0"/>
+              <a:cs typeface="Century Gothic" charset="0"/>
+            </a:endParaRPr>
+          </a:p>
+        </p:txBody>
+      </p:sp>
+      <p:sp>
+        <p:nvSpPr>
+          <p:cNvPr id="51" name="TextBox 50"/>
+          <p:cNvSpPr txBox="1"/>
+          <p:nvPr/>
+        </p:nvSpPr>
+        <p:spPr>
+          <a:xfrm>
+            <a:off x="380315" y="30220383"/>
+            <a:ext cx="13766743" cy="5970865"/>
+          </a:xfrm>
+          <a:prstGeom prst="rect">
+            <a:avLst/>
+          </a:prstGeom>
+          <a:noFill/>
+        </p:spPr>
+        <p:txBody>
+          <a:bodyPr wrap="square" rtlCol="0">
+            <a:spAutoFit/>
+          </a:bodyPr>
+          <a:lstStyle/>
+          <a:p>
+            <a:pPr>
+              <a:buClr>
+                <a:srgbClr val="990000"/>
+              </a:buClr>
+            </a:pPr>
+            <a:r>
+              <a:rPr lang="fr-CH" sz="3200" b="1" dirty="0" smtClean="0">
+                <a:solidFill>
+                  <a:srgbClr val="333333"/>
+                </a:solidFill>
+                <a:latin typeface="Century Gothic"/>
+              </a:rPr>
+              <a:t>LSTM model prediction:</a:t>
+            </a:r>
+          </a:p>
+          <a:p>
+            <a:pPr>
+              <a:buClr>
+                <a:srgbClr val="990000"/>
+              </a:buClr>
+            </a:pPr>
+            <a:endParaRPr lang="fr-CH" sz="3000" dirty="0" smtClean="0">
+              <a:solidFill>
+                <a:srgbClr val="333333"/>
+              </a:solidFill>
+              <a:latin typeface="Century Gothic"/>
+            </a:endParaRPr>
+          </a:p>
+          <a:p>
+            <a:pPr>
+              <a:buClr>
+                <a:srgbClr val="990000"/>
+              </a:buClr>
+            </a:pPr>
+            <a:r>
+              <a:rPr lang="fr-CH" sz="3000" b="1" dirty="0" smtClean="0">
+                <a:solidFill>
+                  <a:srgbClr val="333333"/>
+                </a:solidFill>
+                <a:latin typeface="Century Gothic"/>
+              </a:rPr>
+              <a:t>Models: </a:t>
+            </a:r>
+            <a:r>
+              <a:rPr lang="fr-CH" sz="3000" dirty="0" smtClean="0">
+                <a:solidFill>
+                  <a:srgbClr val="333333"/>
+                </a:solidFill>
+                <a:latin typeface="Century Gothic"/>
+              </a:rPr>
+              <a:t>A simple LSTM (long short term memory). The problem is formed as a regression task with RNN (Recurent neura network). </a:t>
+            </a:r>
+          </a:p>
+          <a:p>
+            <a:pPr>
+              <a:buClr>
+                <a:srgbClr val="990000"/>
+              </a:buClr>
+            </a:pPr>
+            <a:endParaRPr lang="fr-CH" sz="3000" dirty="0" smtClean="0">
+              <a:solidFill>
+                <a:srgbClr val="333333"/>
+              </a:solidFill>
+              <a:latin typeface="Century Gothic"/>
+            </a:endParaRPr>
+          </a:p>
+          <a:p>
+            <a:pPr>
+              <a:buClr>
+                <a:srgbClr val="990000"/>
+              </a:buClr>
+            </a:pPr>
+            <a:endParaRPr lang="fr-CH" sz="3000" b="1" dirty="0">
+              <a:solidFill>
+                <a:srgbClr val="333333"/>
+              </a:solidFill>
+              <a:latin typeface="Century Gothic"/>
+            </a:endParaRPr>
+          </a:p>
+          <a:p>
+            <a:pPr>
+              <a:buClr>
+                <a:srgbClr val="990000"/>
+              </a:buClr>
+            </a:pPr>
+            <a:r>
+              <a:rPr lang="fr-CH" sz="3200" b="1" dirty="0" smtClean="0">
+                <a:solidFill>
+                  <a:srgbClr val="333333"/>
+                </a:solidFill>
+                <a:latin typeface="Century Gothic"/>
+              </a:rPr>
+              <a:t>Result</a:t>
+            </a:r>
+            <a:r>
+              <a:rPr lang="fr-CH" sz="3000" b="1" dirty="0" smtClean="0">
+                <a:solidFill>
+                  <a:srgbClr val="333333"/>
+                </a:solidFill>
+                <a:latin typeface="Century Gothic"/>
+              </a:rPr>
+              <a:t>: </a:t>
+            </a:r>
+            <a:r>
+              <a:rPr lang="fr-CH" sz="3000" dirty="0" smtClean="0">
+                <a:solidFill>
+                  <a:srgbClr val="333333"/>
+                </a:solidFill>
+                <a:latin typeface="Century Gothic"/>
+              </a:rPr>
+              <a:t>The model is not making true forecast. it has simply learn to output the previous time value with some minor change. In oder words, it simply mimick the time serie. It make sense as the model is trying to reduce the error and the previous time value are not to far away from the future time value. </a:t>
+            </a:r>
+          </a:p>
+          <a:p>
+            <a:pPr marL="914400" indent="-914400">
+              <a:buClr>
+                <a:srgbClr val="990000"/>
+              </a:buClr>
+              <a:buFont typeface="+mj-lt"/>
+              <a:buAutoNum type="arabicPeriod"/>
+            </a:pPr>
+            <a:endParaRPr lang="fr-CH" sz="4800" b="1" dirty="0">
+              <a:solidFill>
+                <a:srgbClr val="333333"/>
+              </a:solidFill>
+              <a:latin typeface="Century Gothic"/>
+            </a:endParaRPr>
+          </a:p>
+        </p:txBody>
+      </p:sp>
+      <p:sp>
+        <p:nvSpPr>
+          <p:cNvPr id="52" name="TextBox 51"/>
+          <p:cNvSpPr txBox="1"/>
+          <p:nvPr/>
+        </p:nvSpPr>
+        <p:spPr>
+          <a:xfrm>
+            <a:off x="14350248" y="30220383"/>
+            <a:ext cx="15778518" cy="4708981"/>
+          </a:xfrm>
+          <a:prstGeom prst="rect">
+            <a:avLst/>
+          </a:prstGeom>
+          <a:noFill/>
+        </p:spPr>
+        <p:txBody>
+          <a:bodyPr wrap="square" rtlCol="0">
+            <a:spAutoFit/>
+          </a:bodyPr>
+          <a:lstStyle/>
+          <a:p>
+            <a:pPr>
+              <a:buClr>
+                <a:srgbClr val="990000"/>
+              </a:buClr>
+            </a:pPr>
+            <a:r>
+              <a:rPr lang="fr-CH" sz="3000" b="1" dirty="0" smtClean="0">
+                <a:solidFill>
+                  <a:srgbClr val="333333"/>
+                </a:solidFill>
+                <a:latin typeface="Century Gothic"/>
+              </a:rPr>
+              <a:t>SARIMA model prediction for seasonal words:</a:t>
+            </a:r>
+          </a:p>
+          <a:p>
+            <a:pPr>
+              <a:buClr>
+                <a:srgbClr val="990000"/>
+              </a:buClr>
+            </a:pPr>
+            <a:endParaRPr lang="fr-CH" sz="3000" dirty="0">
+              <a:solidFill>
+                <a:srgbClr val="333333"/>
+              </a:solidFill>
+              <a:latin typeface="Century Gothic"/>
+            </a:endParaRPr>
+          </a:p>
+          <a:p>
+            <a:pPr>
+              <a:buClr>
+                <a:srgbClr val="990000"/>
+              </a:buClr>
+            </a:pPr>
+            <a:r>
+              <a:rPr lang="fr-CH" sz="3000" b="1" dirty="0" smtClean="0">
+                <a:solidFill>
+                  <a:srgbClr val="333333"/>
+                </a:solidFill>
+                <a:latin typeface="Century Gothic"/>
+              </a:rPr>
+              <a:t>Models: </a:t>
+            </a:r>
+            <a:r>
+              <a:rPr lang="fr-CH" sz="3000" dirty="0" smtClean="0">
+                <a:solidFill>
+                  <a:srgbClr val="333333"/>
+                </a:solidFill>
+                <a:latin typeface="Century Gothic"/>
+              </a:rPr>
+              <a:t>A SARIMA (Seasonal autoregressive integraded moving average) model. This is a combination of autoregression with moving average component plus seasonal component in order to predict the future time value.</a:t>
+            </a:r>
+          </a:p>
+          <a:p>
+            <a:pPr>
+              <a:buClr>
+                <a:srgbClr val="990000"/>
+              </a:buClr>
+            </a:pPr>
+            <a:endParaRPr lang="fr-CH" sz="3000" b="1" dirty="0">
+              <a:solidFill>
+                <a:srgbClr val="333333"/>
+              </a:solidFill>
+              <a:latin typeface="Century Gothic"/>
+            </a:endParaRPr>
+          </a:p>
+          <a:p>
+            <a:pPr>
+              <a:buClr>
+                <a:srgbClr val="990000"/>
+              </a:buClr>
+            </a:pPr>
+            <a:r>
+              <a:rPr lang="fr-CH" sz="3000" b="1" dirty="0" smtClean="0">
+                <a:solidFill>
+                  <a:srgbClr val="333333"/>
+                </a:solidFill>
+                <a:latin typeface="Century Gothic"/>
+              </a:rPr>
+              <a:t>Result: </a:t>
+            </a:r>
+            <a:r>
+              <a:rPr lang="fr-CH" sz="3000" dirty="0" smtClean="0">
+                <a:solidFill>
+                  <a:srgbClr val="333333"/>
+                </a:solidFill>
+                <a:latin typeface="Century Gothic"/>
+              </a:rPr>
+              <a:t>The model is able to predict the correct seasonality of the words and output a coherent local trend. It is not able to integrate changing trend which can regarded as random movement. The output is a repetitive sequence in the same direction. The reliability of the prediction decreases as we predict long time horizon. </a:t>
+            </a:r>
+            <a:endParaRPr lang="fr-CH" sz="3000" b="1" dirty="0">
+              <a:solidFill>
+                <a:srgbClr val="333333"/>
+              </a:solidFill>
+              <a:latin typeface="Century Gothic"/>
+            </a:endParaRPr>
+          </a:p>
+        </p:txBody>
+      </p:sp>
+      <p:pic>
+        <p:nvPicPr>
+          <p:cNvPr id="53" name="Picture 52" descr="Neiger_three_year_forecast.png"/>
+          <p:cNvPicPr>
+            <a:picLocks noChangeAspect="1"/>
+          </p:cNvPicPr>
+          <p:nvPr/>
+        </p:nvPicPr>
+        <p:blipFill>
+          <a:blip r:embed="rId11">
+            <a:extLst>
+              <a:ext uri="{28A0092B-C50C-407E-A947-70E740481C1C}">
+                <a14:useLocalDpi xmlns:a14="http://schemas.microsoft.com/office/drawing/2010/main" val="0"/>
+              </a:ext>
+            </a:extLst>
+          </a:blip>
+          <a:stretch>
+            <a:fillRect/>
+          </a:stretch>
+        </p:blipFill>
+        <p:spPr>
+          <a:xfrm>
+            <a:off x="16652446" y="35531646"/>
+            <a:ext cx="10006440" cy="6877391"/>
+          </a:xfrm>
+          <a:prstGeom prst="rect">
+            <a:avLst/>
+          </a:prstGeom>
+        </p:spPr>
+      </p:pic>
+      <p:pic>
+        <p:nvPicPr>
+          <p:cNvPr id="54" name="Picture 53" descr="LSTM_figure.png"/>
+          <p:cNvPicPr>
+            <a:picLocks noChangeAspect="1"/>
+          </p:cNvPicPr>
+          <p:nvPr/>
+        </p:nvPicPr>
+        <p:blipFill>
+          <a:blip r:embed="rId12">
+            <a:extLst>
+              <a:ext uri="{28A0092B-C50C-407E-A947-70E740481C1C}">
+                <a14:useLocalDpi xmlns:a14="http://schemas.microsoft.com/office/drawing/2010/main" val="0"/>
+              </a:ext>
+            </a:extLst>
+          </a:blip>
+          <a:stretch>
+            <a:fillRect/>
+          </a:stretch>
+        </p:blipFill>
+        <p:spPr>
+          <a:xfrm>
+            <a:off x="2253824" y="35531646"/>
+            <a:ext cx="10006441" cy="6877391"/>
+          </a:xfrm>
+          <a:prstGeom prst="rect">
+            <a:avLst/>
+          </a:prstGeom>
+        </p:spPr>
+      </p:pic>
     </p:spTree>
     <p:extLst>
       <p:ext uri="{BB962C8B-B14F-4D97-AF65-F5344CB8AC3E}">

</xml_diff>